<commit_message>
commiting git crimes, more graphics
</commit_message>
<xml_diff>
--- a/doc/Graphics.pptx
+++ b/doc/Graphics.pptx
@@ -8,7 +8,9 @@
     <p:sldId id="256" r:id="rId2"/>
     <p:sldId id="257" r:id="rId3"/>
     <p:sldId id="258" r:id="rId4"/>
-    <p:sldId id="259" r:id="rId5"/>
+    <p:sldId id="260" r:id="rId5"/>
+    <p:sldId id="261" r:id="rId6"/>
+    <p:sldId id="259" r:id="rId7"/>
   </p:sldIdLst>
   <p:sldSz cx="12192000" cy="6858000"/>
   <p:notesSz cx="6858000" cy="9144000"/>
@@ -262,7 +264,7 @@
           <a:p>
             <a:fld id="{443DBE56-B378-4DDD-B546-6CED79040F65}" type="datetimeFigureOut">
               <a:rPr lang="de-DE" smtClean="0"/>
-              <a:t>28.10.2024</a:t>
+              <a:t>11.11.2024</a:t>
             </a:fld>
             <a:endParaRPr lang="de-DE"/>
           </a:p>
@@ -460,7 +462,7 @@
           <a:p>
             <a:fld id="{443DBE56-B378-4DDD-B546-6CED79040F65}" type="datetimeFigureOut">
               <a:rPr lang="de-DE" smtClean="0"/>
-              <a:t>28.10.2024</a:t>
+              <a:t>11.11.2024</a:t>
             </a:fld>
             <a:endParaRPr lang="de-DE"/>
           </a:p>
@@ -668,7 +670,7 @@
           <a:p>
             <a:fld id="{443DBE56-B378-4DDD-B546-6CED79040F65}" type="datetimeFigureOut">
               <a:rPr lang="de-DE" smtClean="0"/>
-              <a:t>28.10.2024</a:t>
+              <a:t>11.11.2024</a:t>
             </a:fld>
             <a:endParaRPr lang="de-DE"/>
           </a:p>
@@ -866,7 +868,7 @@
           <a:p>
             <a:fld id="{443DBE56-B378-4DDD-B546-6CED79040F65}" type="datetimeFigureOut">
               <a:rPr lang="de-DE" smtClean="0"/>
-              <a:t>28.10.2024</a:t>
+              <a:t>11.11.2024</a:t>
             </a:fld>
             <a:endParaRPr lang="de-DE"/>
           </a:p>
@@ -1141,7 +1143,7 @@
           <a:p>
             <a:fld id="{443DBE56-B378-4DDD-B546-6CED79040F65}" type="datetimeFigureOut">
               <a:rPr lang="de-DE" smtClean="0"/>
-              <a:t>28.10.2024</a:t>
+              <a:t>11.11.2024</a:t>
             </a:fld>
             <a:endParaRPr lang="de-DE"/>
           </a:p>
@@ -1406,7 +1408,7 @@
           <a:p>
             <a:fld id="{443DBE56-B378-4DDD-B546-6CED79040F65}" type="datetimeFigureOut">
               <a:rPr lang="de-DE" smtClean="0"/>
-              <a:t>28.10.2024</a:t>
+              <a:t>11.11.2024</a:t>
             </a:fld>
             <a:endParaRPr lang="de-DE"/>
           </a:p>
@@ -1818,7 +1820,7 @@
           <a:p>
             <a:fld id="{443DBE56-B378-4DDD-B546-6CED79040F65}" type="datetimeFigureOut">
               <a:rPr lang="de-DE" smtClean="0"/>
-              <a:t>28.10.2024</a:t>
+              <a:t>11.11.2024</a:t>
             </a:fld>
             <a:endParaRPr lang="de-DE"/>
           </a:p>
@@ -1959,7 +1961,7 @@
           <a:p>
             <a:fld id="{443DBE56-B378-4DDD-B546-6CED79040F65}" type="datetimeFigureOut">
               <a:rPr lang="de-DE" smtClean="0"/>
-              <a:t>28.10.2024</a:t>
+              <a:t>11.11.2024</a:t>
             </a:fld>
             <a:endParaRPr lang="de-DE"/>
           </a:p>
@@ -2072,7 +2074,7 @@
           <a:p>
             <a:fld id="{443DBE56-B378-4DDD-B546-6CED79040F65}" type="datetimeFigureOut">
               <a:rPr lang="de-DE" smtClean="0"/>
-              <a:t>28.10.2024</a:t>
+              <a:t>11.11.2024</a:t>
             </a:fld>
             <a:endParaRPr lang="de-DE"/>
           </a:p>
@@ -2383,7 +2385,7 @@
           <a:p>
             <a:fld id="{443DBE56-B378-4DDD-B546-6CED79040F65}" type="datetimeFigureOut">
               <a:rPr lang="de-DE" smtClean="0"/>
-              <a:t>28.10.2024</a:t>
+              <a:t>11.11.2024</a:t>
             </a:fld>
             <a:endParaRPr lang="de-DE"/>
           </a:p>
@@ -2671,7 +2673,7 @@
           <a:p>
             <a:fld id="{443DBE56-B378-4DDD-B546-6CED79040F65}" type="datetimeFigureOut">
               <a:rPr lang="de-DE" smtClean="0"/>
-              <a:t>28.10.2024</a:t>
+              <a:t>11.11.2024</a:t>
             </a:fld>
             <a:endParaRPr lang="de-DE"/>
           </a:p>
@@ -2912,7 +2914,7 @@
           <a:p>
             <a:fld id="{443DBE56-B378-4DDD-B546-6CED79040F65}" type="datetimeFigureOut">
               <a:rPr lang="de-DE" smtClean="0"/>
-              <a:t>28.10.2024</a:t>
+              <a:t>11.11.2024</a:t>
             </a:fld>
             <a:endParaRPr lang="de-DE"/>
           </a:p>
@@ -3423,7 +3425,7 @@
         </p:nvGrpSpPr>
         <p:grpSpPr>
           <a:xfrm>
-            <a:off x="1020443" y="211975"/>
+            <a:off x="484979" y="1788039"/>
             <a:ext cx="3446736" cy="4142663"/>
             <a:chOff x="1020443" y="211975"/>
             <a:chExt cx="3446736" cy="4142663"/>
@@ -4037,7 +4039,7 @@
         </p:nvGrpSpPr>
         <p:grpSpPr>
           <a:xfrm>
-            <a:off x="5795872" y="509781"/>
+            <a:off x="5464347" y="1619711"/>
             <a:ext cx="5276680" cy="3479097"/>
             <a:chOff x="5795872" y="509781"/>
             <a:chExt cx="5276680" cy="3479097"/>
@@ -4996,871 +4998,1018 @@
           <a:chExt cx="0" cy="0"/>
         </a:xfrm>
       </p:grpSpPr>
-      <p:sp>
-        <p:nvSpPr>
-          <p:cNvPr id="2" name="Ellipse 1">
+      <p:grpSp>
+        <p:nvGrpSpPr>
+          <p:cNvPr id="22" name="Gruppieren 21">
             <a:extLst>
               <a:ext uri="{FF2B5EF4-FFF2-40B4-BE49-F238E27FC236}">
-                <a16:creationId xmlns:a16="http://schemas.microsoft.com/office/drawing/2014/main" id="{2F8320A7-CDDA-8CB1-6F20-A683325EEFC9}"/>
+                <a16:creationId xmlns:a16="http://schemas.microsoft.com/office/drawing/2014/main" id="{FF81017E-BD5A-700B-BE19-28D4E8B0E086}"/>
               </a:ext>
             </a:extLst>
           </p:cNvPr>
-          <p:cNvSpPr/>
+          <p:cNvGrpSpPr/>
           <p:nvPr/>
-        </p:nvSpPr>
-        <p:spPr>
+        </p:nvGrpSpPr>
+        <p:grpSpPr>
           <a:xfrm>
-            <a:off x="3553691" y="1209503"/>
-            <a:ext cx="569422" cy="569422"/>
+            <a:off x="1417319" y="1209503"/>
+            <a:ext cx="9617826" cy="3873729"/>
+            <a:chOff x="1417319" y="1209503"/>
+            <a:chExt cx="9617826" cy="3873729"/>
           </a:xfrm>
-          <a:prstGeom prst="ellipse">
-            <a:avLst/>
-          </a:prstGeom>
-          <a:solidFill>
-            <a:srgbClr val="FFFF00"/>
-          </a:solidFill>
-          <a:ln>
+        </p:grpSpPr>
+        <p:sp>
+          <p:nvSpPr>
+            <p:cNvPr id="3" name="Rechteck 2">
+              <a:extLst>
+                <a:ext uri="{FF2B5EF4-FFF2-40B4-BE49-F238E27FC236}">
+                  <a16:creationId xmlns:a16="http://schemas.microsoft.com/office/drawing/2014/main" id="{094AAD61-CCE5-0241-916A-BE96BB172440}"/>
+                </a:ext>
+              </a:extLst>
+            </p:cNvPr>
+            <p:cNvSpPr/>
+            <p:nvPr/>
+          </p:nvSpPr>
+          <p:spPr>
+            <a:xfrm>
+              <a:off x="1417319" y="3383280"/>
+              <a:ext cx="9617826" cy="1276004"/>
+            </a:xfrm>
+            <a:prstGeom prst="rect">
+              <a:avLst/>
+            </a:prstGeom>
             <a:solidFill>
-              <a:schemeClr val="tx1"/>
+              <a:schemeClr val="accent3">
+                <a:lumMod val="40000"/>
+                <a:lumOff val="60000"/>
+              </a:schemeClr>
             </a:solidFill>
-          </a:ln>
-        </p:spPr>
-        <p:style>
-          <a:lnRef idx="2">
-            <a:schemeClr val="accent1">
-              <a:shade val="15000"/>
-            </a:schemeClr>
-          </a:lnRef>
-          <a:fillRef idx="1">
-            <a:schemeClr val="accent1"/>
-          </a:fillRef>
-          <a:effectRef idx="0">
-            <a:schemeClr val="accent1"/>
-          </a:effectRef>
-          <a:fontRef idx="minor">
-            <a:schemeClr val="lt1"/>
-          </a:fontRef>
-        </p:style>
-        <p:txBody>
-          <a:bodyPr rtlCol="0" anchor="ctr"/>
-          <a:lstStyle/>
-          <a:p>
-            <a:pPr algn="ctr"/>
-            <a:endParaRPr lang="de-DE"/>
-          </a:p>
-        </p:txBody>
-      </p:sp>
-      <p:sp>
-        <p:nvSpPr>
-          <p:cNvPr id="3" name="Rechteck 2">
-            <a:extLst>
-              <a:ext uri="{FF2B5EF4-FFF2-40B4-BE49-F238E27FC236}">
-                <a16:creationId xmlns:a16="http://schemas.microsoft.com/office/drawing/2014/main" id="{094AAD61-CCE5-0241-916A-BE96BB172440}"/>
-              </a:ext>
-            </a:extLst>
-          </p:cNvPr>
-          <p:cNvSpPr/>
-          <p:nvPr/>
-        </p:nvSpPr>
-        <p:spPr>
-          <a:xfrm>
-            <a:off x="1417319" y="3383280"/>
-            <a:ext cx="9617826" cy="1276004"/>
-          </a:xfrm>
-          <a:prstGeom prst="rect">
-            <a:avLst/>
-          </a:prstGeom>
-          <a:solidFill>
-            <a:schemeClr val="accent3">
-              <a:lumMod val="40000"/>
-              <a:lumOff val="60000"/>
-            </a:schemeClr>
-          </a:solidFill>
-          <a:ln>
-            <a:solidFill>
-              <a:schemeClr val="tx1"/>
-            </a:solidFill>
-          </a:ln>
-        </p:spPr>
-        <p:style>
-          <a:lnRef idx="2">
-            <a:schemeClr val="accent1">
-              <a:shade val="15000"/>
-            </a:schemeClr>
-          </a:lnRef>
-          <a:fillRef idx="1">
-            <a:schemeClr val="accent1"/>
-          </a:fillRef>
-          <a:effectRef idx="0">
-            <a:schemeClr val="accent1"/>
-          </a:effectRef>
-          <a:fontRef idx="minor">
-            <a:schemeClr val="lt1"/>
-          </a:fontRef>
-        </p:style>
-        <p:txBody>
-          <a:bodyPr rtlCol="0" anchor="ctr"/>
-          <a:lstStyle/>
-          <a:p>
-            <a:pPr algn="ctr"/>
-            <a:endParaRPr lang="de-DE"/>
-          </a:p>
-        </p:txBody>
-      </p:sp>
-      <p:cxnSp>
-        <p:nvCxnSpPr>
-          <p:cNvPr id="5" name="Gerader Verbinder 4">
-            <a:extLst>
-              <a:ext uri="{FF2B5EF4-FFF2-40B4-BE49-F238E27FC236}">
-                <a16:creationId xmlns:a16="http://schemas.microsoft.com/office/drawing/2014/main" id="{81D4D7FE-1024-F525-3314-C4FF340A08A5}"/>
-              </a:ext>
-            </a:extLst>
-          </p:cNvPr>
-          <p:cNvCxnSpPr>
-            <a:cxnSpLocks/>
-          </p:cNvCxnSpPr>
-          <p:nvPr/>
-        </p:nvCxnSpPr>
-        <p:spPr>
-          <a:xfrm>
-            <a:off x="6163887" y="3761509"/>
-            <a:ext cx="0" cy="756458"/>
-          </a:xfrm>
-          <a:prstGeom prst="line">
-            <a:avLst/>
-          </a:prstGeom>
-          <a:ln>
-            <a:solidFill>
-              <a:schemeClr val="tx1"/>
-            </a:solidFill>
-            <a:prstDash val="lgDashDot"/>
-          </a:ln>
-        </p:spPr>
-        <p:style>
-          <a:lnRef idx="2">
-            <a:schemeClr val="accent1"/>
-          </a:lnRef>
-          <a:fillRef idx="0">
-            <a:schemeClr val="accent1"/>
-          </a:fillRef>
-          <a:effectRef idx="1">
-            <a:schemeClr val="accent1"/>
-          </a:effectRef>
-          <a:fontRef idx="minor">
-            <a:schemeClr val="tx1"/>
-          </a:fontRef>
-        </p:style>
-      </p:cxnSp>
-      <p:cxnSp>
-        <p:nvCxnSpPr>
-          <p:cNvPr id="8" name="Gerader Verbinder 7">
-            <a:extLst>
-              <a:ext uri="{FF2B5EF4-FFF2-40B4-BE49-F238E27FC236}">
-                <a16:creationId xmlns:a16="http://schemas.microsoft.com/office/drawing/2014/main" id="{03F377F6-8EA4-CF8C-EEEA-8BF80B60E1E0}"/>
-              </a:ext>
-            </a:extLst>
-          </p:cNvPr>
-          <p:cNvCxnSpPr>
-            <a:cxnSpLocks/>
-          </p:cNvCxnSpPr>
-          <p:nvPr/>
-        </p:nvCxnSpPr>
-        <p:spPr>
-          <a:xfrm>
-            <a:off x="5297978" y="4143894"/>
-            <a:ext cx="1730433" cy="0"/>
-          </a:xfrm>
-          <a:prstGeom prst="line">
-            <a:avLst/>
-          </a:prstGeom>
-          <a:ln>
-            <a:solidFill>
-              <a:schemeClr val="tx1"/>
-            </a:solidFill>
-            <a:prstDash val="lgDashDot"/>
-          </a:ln>
-        </p:spPr>
-        <p:style>
-          <a:lnRef idx="2">
-            <a:schemeClr val="accent1"/>
-          </a:lnRef>
-          <a:fillRef idx="0">
-            <a:schemeClr val="accent1"/>
-          </a:fillRef>
-          <a:effectRef idx="1">
-            <a:schemeClr val="accent1"/>
-          </a:effectRef>
-          <a:fontRef idx="minor">
-            <a:schemeClr val="tx1"/>
-          </a:fontRef>
-        </p:style>
-      </p:cxnSp>
-      <p:sp>
-        <p:nvSpPr>
-          <p:cNvPr id="10" name="Ellipse 9">
-            <a:extLst>
-              <a:ext uri="{FF2B5EF4-FFF2-40B4-BE49-F238E27FC236}">
-                <a16:creationId xmlns:a16="http://schemas.microsoft.com/office/drawing/2014/main" id="{686D0170-C117-9618-F3DC-9AF71C17229F}"/>
-              </a:ext>
-            </a:extLst>
-          </p:cNvPr>
-          <p:cNvSpPr/>
-          <p:nvPr/>
-        </p:nvSpPr>
-        <p:spPr>
-          <a:xfrm>
-            <a:off x="5433753" y="3961017"/>
-            <a:ext cx="1460268" cy="365754"/>
-          </a:xfrm>
-          <a:prstGeom prst="ellipse">
-            <a:avLst/>
-          </a:prstGeom>
-          <a:noFill/>
-          <a:ln>
-            <a:solidFill>
-              <a:schemeClr val="tx1"/>
-            </a:solidFill>
-            <a:prstDash val="dash"/>
-          </a:ln>
-        </p:spPr>
-        <p:style>
-          <a:lnRef idx="2">
-            <a:schemeClr val="accent1">
-              <a:shade val="15000"/>
-            </a:schemeClr>
-          </a:lnRef>
-          <a:fillRef idx="1">
-            <a:schemeClr val="accent1"/>
-          </a:fillRef>
-          <a:effectRef idx="0">
-            <a:schemeClr val="accent1"/>
-          </a:effectRef>
-          <a:fontRef idx="minor">
-            <a:schemeClr val="lt1"/>
-          </a:fontRef>
-        </p:style>
-        <p:txBody>
-          <a:bodyPr rtlCol="0" anchor="ctr"/>
-          <a:lstStyle/>
-          <a:p>
-            <a:pPr algn="ctr"/>
-            <a:endParaRPr lang="de-DE"/>
-          </a:p>
-        </p:txBody>
-      </p:sp>
-      <p:sp>
-        <p:nvSpPr>
-          <p:cNvPr id="12" name="Textfeld 11">
-            <a:extLst>
-              <a:ext uri="{FF2B5EF4-FFF2-40B4-BE49-F238E27FC236}">
-                <a16:creationId xmlns:a16="http://schemas.microsoft.com/office/drawing/2014/main" id="{735FF144-0398-588B-91A7-C8BD5E54E2B3}"/>
-              </a:ext>
-            </a:extLst>
-          </p:cNvPr>
-          <p:cNvSpPr txBox="1"/>
-          <p:nvPr/>
-        </p:nvSpPr>
-        <p:spPr>
-          <a:xfrm>
-            <a:off x="6001789" y="3392177"/>
-            <a:ext cx="295102" cy="369332"/>
-          </a:xfrm>
-          <a:prstGeom prst="rect">
-            <a:avLst/>
-          </a:prstGeom>
-          <a:noFill/>
-        </p:spPr>
-        <p:txBody>
-          <a:bodyPr wrap="square" rtlCol="0">
-            <a:spAutoFit/>
-          </a:bodyPr>
-          <a:lstStyle/>
-          <a:p>
-            <a:r>
-              <a:rPr lang="de-DE" dirty="0"/>
-              <a:t>S</a:t>
-            </a:r>
-          </a:p>
-        </p:txBody>
-      </p:sp>
-      <p:sp>
-        <p:nvSpPr>
-          <p:cNvPr id="13" name="Textfeld 12">
-            <a:extLst>
-              <a:ext uri="{FF2B5EF4-FFF2-40B4-BE49-F238E27FC236}">
-                <a16:creationId xmlns:a16="http://schemas.microsoft.com/office/drawing/2014/main" id="{C467C393-C840-C83C-0937-7BBCBC62446E}"/>
-              </a:ext>
-            </a:extLst>
-          </p:cNvPr>
-          <p:cNvSpPr txBox="1"/>
-          <p:nvPr/>
-        </p:nvSpPr>
-        <p:spPr>
-          <a:xfrm>
-            <a:off x="6001789" y="4543485"/>
-            <a:ext cx="295102" cy="369332"/>
-          </a:xfrm>
-          <a:prstGeom prst="rect">
-            <a:avLst/>
-          </a:prstGeom>
-          <a:noFill/>
-        </p:spPr>
-        <p:txBody>
-          <a:bodyPr wrap="square" rtlCol="0">
-            <a:spAutoFit/>
-          </a:bodyPr>
-          <a:lstStyle/>
-          <a:p>
-            <a:r>
-              <a:rPr lang="de-DE" dirty="0"/>
-              <a:t>N</a:t>
-            </a:r>
-          </a:p>
-        </p:txBody>
-      </p:sp>
-      <p:sp>
-        <p:nvSpPr>
-          <p:cNvPr id="14" name="Textfeld 13">
-            <a:extLst>
-              <a:ext uri="{FF2B5EF4-FFF2-40B4-BE49-F238E27FC236}">
-                <a16:creationId xmlns:a16="http://schemas.microsoft.com/office/drawing/2014/main" id="{2FBC6E72-A75A-1125-73C3-E6249ADD1702}"/>
-              </a:ext>
-            </a:extLst>
-          </p:cNvPr>
-          <p:cNvSpPr txBox="1"/>
-          <p:nvPr/>
-        </p:nvSpPr>
-        <p:spPr>
-          <a:xfrm>
-            <a:off x="5002876" y="3955072"/>
-            <a:ext cx="295102" cy="369332"/>
-          </a:xfrm>
-          <a:prstGeom prst="rect">
-            <a:avLst/>
-          </a:prstGeom>
-          <a:noFill/>
-        </p:spPr>
-        <p:txBody>
-          <a:bodyPr wrap="square" rtlCol="0">
-            <a:spAutoFit/>
-          </a:bodyPr>
-          <a:lstStyle/>
-          <a:p>
-            <a:r>
-              <a:rPr lang="de-DE" dirty="0"/>
-              <a:t>E</a:t>
-            </a:r>
-          </a:p>
-        </p:txBody>
-      </p:sp>
-      <p:sp>
-        <p:nvSpPr>
-          <p:cNvPr id="15" name="Textfeld 14">
-            <a:extLst>
-              <a:ext uri="{FF2B5EF4-FFF2-40B4-BE49-F238E27FC236}">
-                <a16:creationId xmlns:a16="http://schemas.microsoft.com/office/drawing/2014/main" id="{0DE16CD1-A7D5-239E-8494-BB560A83E196}"/>
-              </a:ext>
-            </a:extLst>
-          </p:cNvPr>
-          <p:cNvSpPr txBox="1"/>
-          <p:nvPr/>
-        </p:nvSpPr>
-        <p:spPr>
-          <a:xfrm>
-            <a:off x="7006243" y="3955072"/>
-            <a:ext cx="295102" cy="369332"/>
-          </a:xfrm>
-          <a:prstGeom prst="rect">
-            <a:avLst/>
-          </a:prstGeom>
-          <a:noFill/>
-        </p:spPr>
-        <p:txBody>
-          <a:bodyPr wrap="square" rtlCol="0">
-            <a:spAutoFit/>
-          </a:bodyPr>
-          <a:lstStyle/>
-          <a:p>
-            <a:r>
-              <a:rPr lang="de-DE" dirty="0"/>
-              <a:t>W</a:t>
-            </a:r>
-          </a:p>
-        </p:txBody>
-      </p:sp>
-      <p:cxnSp>
-        <p:nvCxnSpPr>
-          <p:cNvPr id="17" name="Gerader Verbinder 16">
-            <a:extLst>
-              <a:ext uri="{FF2B5EF4-FFF2-40B4-BE49-F238E27FC236}">
-                <a16:creationId xmlns:a16="http://schemas.microsoft.com/office/drawing/2014/main" id="{B347C1D2-454B-8C88-64CE-C3934580D2AB}"/>
-              </a:ext>
-            </a:extLst>
-          </p:cNvPr>
-          <p:cNvCxnSpPr>
-            <a:stCxn id="2" idx="4"/>
-          </p:cNvCxnSpPr>
-          <p:nvPr/>
-        </p:nvCxnSpPr>
-        <p:spPr>
-          <a:xfrm>
-            <a:off x="3838402" y="1778925"/>
-            <a:ext cx="0" cy="1613252"/>
-          </a:xfrm>
-          <a:prstGeom prst="line">
-            <a:avLst/>
-          </a:prstGeom>
-          <a:ln>
-            <a:solidFill>
-              <a:schemeClr val="tx1"/>
-            </a:solidFill>
-            <a:prstDash val="lgDashDot"/>
-          </a:ln>
-        </p:spPr>
-        <p:style>
-          <a:lnRef idx="2">
-            <a:schemeClr val="accent1"/>
-          </a:lnRef>
-          <a:fillRef idx="0">
-            <a:schemeClr val="accent1"/>
-          </a:fillRef>
-          <a:effectRef idx="1">
-            <a:schemeClr val="accent1"/>
-          </a:effectRef>
-          <a:fontRef idx="minor">
-            <a:schemeClr val="tx1"/>
-          </a:fontRef>
-        </p:style>
-      </p:cxnSp>
-      <p:cxnSp>
-        <p:nvCxnSpPr>
-          <p:cNvPr id="18" name="Gerader Verbinder 17">
-            <a:extLst>
-              <a:ext uri="{FF2B5EF4-FFF2-40B4-BE49-F238E27FC236}">
-                <a16:creationId xmlns:a16="http://schemas.microsoft.com/office/drawing/2014/main" id="{D05F7CDE-FB15-4F8A-0663-42C3793505E5}"/>
-              </a:ext>
-            </a:extLst>
-          </p:cNvPr>
-          <p:cNvCxnSpPr>
-            <a:cxnSpLocks/>
-          </p:cNvCxnSpPr>
-          <p:nvPr/>
-        </p:nvCxnSpPr>
-        <p:spPr>
-          <a:xfrm>
-            <a:off x="3838402" y="1508760"/>
-            <a:ext cx="2324792" cy="2630978"/>
-          </a:xfrm>
-          <a:prstGeom prst="line">
-            <a:avLst/>
-          </a:prstGeom>
-          <a:ln>
-            <a:solidFill>
-              <a:schemeClr val="tx1"/>
-            </a:solidFill>
-            <a:prstDash val="lgDashDot"/>
-          </a:ln>
-        </p:spPr>
-        <p:style>
-          <a:lnRef idx="2">
-            <a:schemeClr val="accent1"/>
-          </a:lnRef>
-          <a:fillRef idx="0">
-            <a:schemeClr val="accent1"/>
-          </a:fillRef>
-          <a:effectRef idx="1">
-            <a:schemeClr val="accent1"/>
-          </a:effectRef>
-          <a:fontRef idx="minor">
-            <a:schemeClr val="tx1"/>
-          </a:fontRef>
-        </p:style>
-      </p:cxnSp>
-      <p:cxnSp>
-        <p:nvCxnSpPr>
-          <p:cNvPr id="21" name="Gerader Verbinder 20">
-            <a:extLst>
-              <a:ext uri="{FF2B5EF4-FFF2-40B4-BE49-F238E27FC236}">
-                <a16:creationId xmlns:a16="http://schemas.microsoft.com/office/drawing/2014/main" id="{C16BAC41-3F24-6BDB-03C0-6540C7A10DF0}"/>
-              </a:ext>
-            </a:extLst>
-          </p:cNvPr>
-          <p:cNvCxnSpPr>
-            <a:cxnSpLocks/>
-          </p:cNvCxnSpPr>
-          <p:nvPr/>
-        </p:nvCxnSpPr>
-        <p:spPr>
-          <a:xfrm>
-            <a:off x="3847928" y="3392177"/>
-            <a:ext cx="2315266" cy="747561"/>
-          </a:xfrm>
-          <a:prstGeom prst="line">
-            <a:avLst/>
-          </a:prstGeom>
-          <a:ln>
-            <a:solidFill>
-              <a:schemeClr val="tx1"/>
-            </a:solidFill>
-            <a:prstDash val="lgDashDot"/>
-          </a:ln>
-        </p:spPr>
-        <p:style>
-          <a:lnRef idx="2">
-            <a:schemeClr val="accent1"/>
-          </a:lnRef>
-          <a:fillRef idx="0">
-            <a:schemeClr val="accent1"/>
-          </a:fillRef>
-          <a:effectRef idx="1">
-            <a:schemeClr val="accent1"/>
-          </a:effectRef>
-          <a:fontRef idx="minor">
-            <a:schemeClr val="tx1"/>
-          </a:fontRef>
-        </p:style>
-      </p:cxnSp>
-      <p:sp>
-        <p:nvSpPr>
-          <p:cNvPr id="26" name="Bogen 25">
-            <a:extLst>
-              <a:ext uri="{FF2B5EF4-FFF2-40B4-BE49-F238E27FC236}">
-                <a16:creationId xmlns:a16="http://schemas.microsoft.com/office/drawing/2014/main" id="{D434DA83-A2FA-637A-ED2A-C157BB3CD026}"/>
-              </a:ext>
-            </a:extLst>
-          </p:cNvPr>
-          <p:cNvSpPr/>
-          <p:nvPr/>
-        </p:nvSpPr>
-        <p:spPr>
-          <a:xfrm rot="10800000">
-            <a:off x="5320848" y="3840480"/>
-            <a:ext cx="1684692" cy="598516"/>
-          </a:xfrm>
-          <a:prstGeom prst="arc">
-            <a:avLst>
-              <a:gd name="adj1" fmla="val 16200000"/>
-              <a:gd name="adj2" fmla="val 1050638"/>
-            </a:avLst>
-          </a:prstGeom>
-          <a:ln>
-            <a:solidFill>
-              <a:schemeClr val="tx1"/>
-            </a:solidFill>
-            <a:prstDash val="solid"/>
-          </a:ln>
-        </p:spPr>
-        <p:style>
-          <a:lnRef idx="2">
-            <a:schemeClr val="accent1"/>
-          </a:lnRef>
-          <a:fillRef idx="0">
-            <a:schemeClr val="accent1"/>
-          </a:fillRef>
-          <a:effectRef idx="1">
-            <a:schemeClr val="accent1"/>
-          </a:effectRef>
-          <a:fontRef idx="minor">
-            <a:schemeClr val="tx1"/>
-          </a:fontRef>
-        </p:style>
-        <p:txBody>
-          <a:bodyPr rtlCol="0" anchor="ctr"/>
-          <a:lstStyle/>
-          <a:p>
-            <a:pPr algn="ctr"/>
-            <a:endParaRPr lang="de-DE"/>
-          </a:p>
-        </p:txBody>
-      </p:sp>
-      <p:sp>
-        <p:nvSpPr>
-          <p:cNvPr id="28" name="Bogen 27">
-            <a:extLst>
-              <a:ext uri="{FF2B5EF4-FFF2-40B4-BE49-F238E27FC236}">
-                <a16:creationId xmlns:a16="http://schemas.microsoft.com/office/drawing/2014/main" id="{F533D56D-48D7-BE53-0A6F-13DE00B5DE6D}"/>
-              </a:ext>
-            </a:extLst>
-          </p:cNvPr>
-          <p:cNvSpPr/>
-          <p:nvPr/>
-        </p:nvSpPr>
-        <p:spPr>
-          <a:xfrm rot="16200000">
-            <a:off x="5219700" y="3475416"/>
-            <a:ext cx="1886988" cy="1328644"/>
-          </a:xfrm>
-          <a:prstGeom prst="arc">
-            <a:avLst>
-              <a:gd name="adj1" fmla="val 17166077"/>
-              <a:gd name="adj2" fmla="val 19199777"/>
-            </a:avLst>
-          </a:prstGeom>
-          <a:ln>
-            <a:solidFill>
-              <a:schemeClr val="tx1"/>
-            </a:solidFill>
-          </a:ln>
-        </p:spPr>
-        <p:style>
-          <a:lnRef idx="2">
-            <a:schemeClr val="accent1"/>
-          </a:lnRef>
-          <a:fillRef idx="0">
-            <a:schemeClr val="accent1"/>
-          </a:fillRef>
-          <a:effectRef idx="1">
-            <a:schemeClr val="accent1"/>
-          </a:effectRef>
-          <a:fontRef idx="minor">
-            <a:schemeClr val="tx1"/>
-          </a:fontRef>
-        </p:style>
-        <p:txBody>
-          <a:bodyPr rtlCol="0" anchor="ctr"/>
-          <a:lstStyle/>
-          <a:p>
-            <a:pPr algn="ctr"/>
-            <a:endParaRPr lang="de-DE"/>
-          </a:p>
-        </p:txBody>
-      </p:sp>
-      <p:cxnSp>
-        <p:nvCxnSpPr>
-          <p:cNvPr id="30" name="Gerade Verbindung mit Pfeil 29">
-            <a:extLst>
-              <a:ext uri="{FF2B5EF4-FFF2-40B4-BE49-F238E27FC236}">
-                <a16:creationId xmlns:a16="http://schemas.microsoft.com/office/drawing/2014/main" id="{5EE88F29-F2E0-BB42-26B0-62D6AB57F7BA}"/>
-              </a:ext>
-            </a:extLst>
-          </p:cNvPr>
-          <p:cNvCxnSpPr>
-            <a:cxnSpLocks/>
-          </p:cNvCxnSpPr>
-          <p:nvPr/>
-        </p:nvCxnSpPr>
-        <p:spPr>
-          <a:xfrm flipH="1" flipV="1">
-            <a:off x="5329709" y="3210567"/>
-            <a:ext cx="820023" cy="910243"/>
-          </a:xfrm>
-          <a:prstGeom prst="straightConnector1">
-            <a:avLst/>
-          </a:prstGeom>
-          <a:ln>
-            <a:solidFill>
-              <a:srgbClr val="FF0000"/>
-            </a:solidFill>
-            <a:tailEnd type="triangle"/>
-          </a:ln>
-        </p:spPr>
-        <p:style>
-          <a:lnRef idx="2">
-            <a:schemeClr val="accent1"/>
-          </a:lnRef>
-          <a:fillRef idx="0">
-            <a:schemeClr val="accent1"/>
-          </a:fillRef>
-          <a:effectRef idx="1">
-            <a:schemeClr val="accent1"/>
-          </a:effectRef>
-          <a:fontRef idx="minor">
-            <a:schemeClr val="tx1"/>
-          </a:fontRef>
-        </p:style>
-      </p:cxnSp>
-      <mc:AlternateContent xmlns:mc="http://schemas.openxmlformats.org/markup-compatibility/2006" xmlns:a14="http://schemas.microsoft.com/office/drawing/2010/main">
-        <mc:Choice Requires="a14">
+            <a:ln>
+              <a:solidFill>
+                <a:schemeClr val="tx1"/>
+              </a:solidFill>
+            </a:ln>
+          </p:spPr>
+          <p:style>
+            <a:lnRef idx="2">
+              <a:schemeClr val="accent1">
+                <a:shade val="15000"/>
+              </a:schemeClr>
+            </a:lnRef>
+            <a:fillRef idx="1">
+              <a:schemeClr val="accent1"/>
+            </a:fillRef>
+            <a:effectRef idx="0">
+              <a:schemeClr val="accent1"/>
+            </a:effectRef>
+            <a:fontRef idx="minor">
+              <a:schemeClr val="lt1"/>
+            </a:fontRef>
+          </p:style>
+          <p:txBody>
+            <a:bodyPr rtlCol="0" anchor="ctr"/>
+            <a:lstStyle/>
+            <a:p>
+              <a:pPr algn="ctr"/>
+              <a:endParaRPr lang="de-DE"/>
+            </a:p>
+          </p:txBody>
+        </p:sp>
+        <p:grpSp>
+          <p:nvGrpSpPr>
+            <p:cNvPr id="16" name="Gruppieren 15">
+              <a:extLst>
+                <a:ext uri="{FF2B5EF4-FFF2-40B4-BE49-F238E27FC236}">
+                  <a16:creationId xmlns:a16="http://schemas.microsoft.com/office/drawing/2014/main" id="{5656A99C-CCD2-88E9-C303-9C3602FB3B11}"/>
+                </a:ext>
+              </a:extLst>
+            </p:cNvPr>
+            <p:cNvGrpSpPr/>
+            <p:nvPr/>
+          </p:nvGrpSpPr>
+          <p:grpSpPr>
+            <a:xfrm>
+              <a:off x="5002876" y="3392177"/>
+              <a:ext cx="2298469" cy="1520640"/>
+              <a:chOff x="5002876" y="3392177"/>
+              <a:chExt cx="2298469" cy="1520640"/>
+            </a:xfrm>
+          </p:grpSpPr>
           <p:sp>
             <p:nvSpPr>
-              <p:cNvPr id="31" name="Textfeld 30">
+              <p:cNvPr id="10" name="Ellipse 9">
                 <a:extLst>
                   <a:ext uri="{FF2B5EF4-FFF2-40B4-BE49-F238E27FC236}">
-                    <a16:creationId xmlns:a16="http://schemas.microsoft.com/office/drawing/2014/main" id="{72CD5F8A-0203-51A8-F3EF-DA5C5A37A6CC}"/>
+                    <a16:creationId xmlns:a16="http://schemas.microsoft.com/office/drawing/2014/main" id="{686D0170-C117-9618-F3DC-9AF71C17229F}"/>
                   </a:ext>
                 </a:extLst>
               </p:cNvPr>
-              <p:cNvSpPr txBox="1"/>
+              <p:cNvSpPr/>
               <p:nvPr/>
             </p:nvSpPr>
             <p:spPr>
               <a:xfrm>
-                <a:off x="5564673" y="3637851"/>
-                <a:ext cx="175048" cy="276999"/>
+                <a:off x="5433753" y="3961017"/>
+                <a:ext cx="1460268" cy="365754"/>
               </a:xfrm>
-              <a:prstGeom prst="rect">
+              <a:prstGeom prst="ellipse">
                 <a:avLst/>
               </a:prstGeom>
               <a:noFill/>
+              <a:ln>
+                <a:solidFill>
+                  <a:schemeClr val="tx1"/>
+                </a:solidFill>
+                <a:prstDash val="dash"/>
+              </a:ln>
             </p:spPr>
+            <p:style>
+              <a:lnRef idx="2">
+                <a:schemeClr val="accent1">
+                  <a:shade val="15000"/>
+                </a:schemeClr>
+              </a:lnRef>
+              <a:fillRef idx="1">
+                <a:schemeClr val="accent1"/>
+              </a:fillRef>
+              <a:effectRef idx="0">
+                <a:schemeClr val="accent1"/>
+              </a:effectRef>
+              <a:fontRef idx="minor">
+                <a:schemeClr val="lt1"/>
+              </a:fontRef>
+            </p:style>
             <p:txBody>
-              <a:bodyPr wrap="none" lIns="0" tIns="0" rIns="0" bIns="0" rtlCol="0">
-                <a:spAutoFit/>
-              </a:bodyPr>
+              <a:bodyPr rtlCol="0" anchor="ctr"/>
               <a:lstStyle/>
               <a:p>
-                <a:pPr/>
-                <a14:m>
-                  <m:oMathPara xmlns:m="http://schemas.openxmlformats.org/officeDocument/2006/math">
-                    <m:oMathParaPr>
-                      <m:jc m:val="centerGroup"/>
-                    </m:oMathParaPr>
-                    <m:oMath xmlns:m="http://schemas.openxmlformats.org/officeDocument/2006/math">
-                      <m:r>
-                        <a:rPr lang="de-DE" b="0" i="1" smtClean="0">
-                          <a:latin typeface="Cambria Math" panose="02040503050406030204" pitchFamily="18" charset="0"/>
-                        </a:rPr>
-                        <m:t>𝜂</m:t>
-                      </m:r>
-                    </m:oMath>
-                  </m:oMathPara>
-                </a14:m>
-                <a:endParaRPr lang="de-DE" b="0" dirty="0"/>
+                <a:pPr algn="ctr"/>
+                <a:endParaRPr lang="de-DE"/>
               </a:p>
             </p:txBody>
           </p:sp>
-        </mc:Choice>
-        <mc:Fallback xmlns="">
-          <p:sp>
-            <p:nvSpPr>
-              <p:cNvPr id="31" name="Textfeld 30">
+          <p:grpSp>
+            <p:nvGrpSpPr>
+              <p:cNvPr id="7" name="Gruppieren 6">
                 <a:extLst>
                   <a:ext uri="{FF2B5EF4-FFF2-40B4-BE49-F238E27FC236}">
-                    <a16:creationId xmlns:a16="http://schemas.microsoft.com/office/drawing/2014/main" id="{72CD5F8A-0203-51A8-F3EF-DA5C5A37A6CC}"/>
+                    <a16:creationId xmlns:a16="http://schemas.microsoft.com/office/drawing/2014/main" id="{570CC725-EF1F-4E0B-C3CA-42D8EA13FC15}"/>
                   </a:ext>
                 </a:extLst>
               </p:cNvPr>
-              <p:cNvSpPr txBox="1">
-                <a:spLocks noRot="1" noChangeAspect="1" noMove="1" noResize="1" noEditPoints="1" noAdjustHandles="1" noChangeArrowheads="1" noChangeShapeType="1" noTextEdit="1"/>
-              </p:cNvSpPr>
+              <p:cNvGrpSpPr/>
+              <p:nvPr/>
+            </p:nvGrpSpPr>
+            <p:grpSpPr>
+              <a:xfrm>
+                <a:off x="5002876" y="3392177"/>
+                <a:ext cx="2298469" cy="1520640"/>
+                <a:chOff x="5002876" y="3392177"/>
+                <a:chExt cx="2298469" cy="1520640"/>
+              </a:xfrm>
+            </p:grpSpPr>
+            <p:cxnSp>
+              <p:nvCxnSpPr>
+                <p:cNvPr id="5" name="Gerader Verbinder 4">
+                  <a:extLst>
+                    <a:ext uri="{FF2B5EF4-FFF2-40B4-BE49-F238E27FC236}">
+                      <a16:creationId xmlns:a16="http://schemas.microsoft.com/office/drawing/2014/main" id="{81D4D7FE-1024-F525-3314-C4FF340A08A5}"/>
+                    </a:ext>
+                  </a:extLst>
+                </p:cNvPr>
+                <p:cNvCxnSpPr>
+                  <a:cxnSpLocks/>
+                </p:cNvCxnSpPr>
+                <p:nvPr/>
+              </p:nvCxnSpPr>
+              <p:spPr>
+                <a:xfrm>
+                  <a:off x="6163887" y="3761509"/>
+                  <a:ext cx="0" cy="756458"/>
+                </a:xfrm>
+                <a:prstGeom prst="line">
+                  <a:avLst/>
+                </a:prstGeom>
+                <a:ln>
+                  <a:solidFill>
+                    <a:schemeClr val="tx1"/>
+                  </a:solidFill>
+                  <a:prstDash val="lgDashDot"/>
+                </a:ln>
+              </p:spPr>
+              <p:style>
+                <a:lnRef idx="2">
+                  <a:schemeClr val="accent1"/>
+                </a:lnRef>
+                <a:fillRef idx="0">
+                  <a:schemeClr val="accent1"/>
+                </a:fillRef>
+                <a:effectRef idx="1">
+                  <a:schemeClr val="accent1"/>
+                </a:effectRef>
+                <a:fontRef idx="minor">
+                  <a:schemeClr val="tx1"/>
+                </a:fontRef>
+              </p:style>
+            </p:cxnSp>
+            <p:cxnSp>
+              <p:nvCxnSpPr>
+                <p:cNvPr id="8" name="Gerader Verbinder 7">
+                  <a:extLst>
+                    <a:ext uri="{FF2B5EF4-FFF2-40B4-BE49-F238E27FC236}">
+                      <a16:creationId xmlns:a16="http://schemas.microsoft.com/office/drawing/2014/main" id="{03F377F6-8EA4-CF8C-EEEA-8BF80B60E1E0}"/>
+                    </a:ext>
+                  </a:extLst>
+                </p:cNvPr>
+                <p:cNvCxnSpPr>
+                  <a:cxnSpLocks/>
+                </p:cNvCxnSpPr>
+                <p:nvPr/>
+              </p:nvCxnSpPr>
+              <p:spPr>
+                <a:xfrm>
+                  <a:off x="5297978" y="4143894"/>
+                  <a:ext cx="1730433" cy="0"/>
+                </a:xfrm>
+                <a:prstGeom prst="line">
+                  <a:avLst/>
+                </a:prstGeom>
+                <a:ln>
+                  <a:solidFill>
+                    <a:schemeClr val="tx1"/>
+                  </a:solidFill>
+                  <a:prstDash val="lgDashDot"/>
+                </a:ln>
+              </p:spPr>
+              <p:style>
+                <a:lnRef idx="2">
+                  <a:schemeClr val="accent1"/>
+                </a:lnRef>
+                <a:fillRef idx="0">
+                  <a:schemeClr val="accent1"/>
+                </a:fillRef>
+                <a:effectRef idx="1">
+                  <a:schemeClr val="accent1"/>
+                </a:effectRef>
+                <a:fontRef idx="minor">
+                  <a:schemeClr val="tx1"/>
+                </a:fontRef>
+              </p:style>
+            </p:cxnSp>
+            <p:sp>
+              <p:nvSpPr>
+                <p:cNvPr id="12" name="Textfeld 11">
+                  <a:extLst>
+                    <a:ext uri="{FF2B5EF4-FFF2-40B4-BE49-F238E27FC236}">
+                      <a16:creationId xmlns:a16="http://schemas.microsoft.com/office/drawing/2014/main" id="{735FF144-0398-588B-91A7-C8BD5E54E2B3}"/>
+                    </a:ext>
+                  </a:extLst>
+                </p:cNvPr>
+                <p:cNvSpPr txBox="1"/>
+                <p:nvPr/>
+              </p:nvSpPr>
+              <p:spPr>
+                <a:xfrm>
+                  <a:off x="6001789" y="3392177"/>
+                  <a:ext cx="295102" cy="369332"/>
+                </a:xfrm>
+                <a:prstGeom prst="rect">
+                  <a:avLst/>
+                </a:prstGeom>
+                <a:noFill/>
+              </p:spPr>
+              <p:txBody>
+                <a:bodyPr wrap="square" rtlCol="0">
+                  <a:spAutoFit/>
+                </a:bodyPr>
+                <a:lstStyle/>
+                <a:p>
+                  <a:r>
+                    <a:rPr lang="de-DE" dirty="0"/>
+                    <a:t>S</a:t>
+                  </a:r>
+                </a:p>
+              </p:txBody>
+            </p:sp>
+            <p:sp>
+              <p:nvSpPr>
+                <p:cNvPr id="13" name="Textfeld 12">
+                  <a:extLst>
+                    <a:ext uri="{FF2B5EF4-FFF2-40B4-BE49-F238E27FC236}">
+                      <a16:creationId xmlns:a16="http://schemas.microsoft.com/office/drawing/2014/main" id="{C467C393-C840-C83C-0937-7BBCBC62446E}"/>
+                    </a:ext>
+                  </a:extLst>
+                </p:cNvPr>
+                <p:cNvSpPr txBox="1"/>
+                <p:nvPr/>
+              </p:nvSpPr>
+              <p:spPr>
+                <a:xfrm>
+                  <a:off x="6001789" y="4543485"/>
+                  <a:ext cx="295102" cy="369332"/>
+                </a:xfrm>
+                <a:prstGeom prst="rect">
+                  <a:avLst/>
+                </a:prstGeom>
+                <a:noFill/>
+              </p:spPr>
+              <p:txBody>
+                <a:bodyPr wrap="square" rtlCol="0">
+                  <a:spAutoFit/>
+                </a:bodyPr>
+                <a:lstStyle/>
+                <a:p>
+                  <a:r>
+                    <a:rPr lang="de-DE" dirty="0"/>
+                    <a:t>N</a:t>
+                  </a:r>
+                </a:p>
+              </p:txBody>
+            </p:sp>
+            <p:sp>
+              <p:nvSpPr>
+                <p:cNvPr id="14" name="Textfeld 13">
+                  <a:extLst>
+                    <a:ext uri="{FF2B5EF4-FFF2-40B4-BE49-F238E27FC236}">
+                      <a16:creationId xmlns:a16="http://schemas.microsoft.com/office/drawing/2014/main" id="{2FBC6E72-A75A-1125-73C3-E6249ADD1702}"/>
+                    </a:ext>
+                  </a:extLst>
+                </p:cNvPr>
+                <p:cNvSpPr txBox="1"/>
+                <p:nvPr/>
+              </p:nvSpPr>
+              <p:spPr>
+                <a:xfrm>
+                  <a:off x="5002876" y="3955072"/>
+                  <a:ext cx="295102" cy="369332"/>
+                </a:xfrm>
+                <a:prstGeom prst="rect">
+                  <a:avLst/>
+                </a:prstGeom>
+                <a:noFill/>
+              </p:spPr>
+              <p:txBody>
+                <a:bodyPr wrap="square" rtlCol="0">
+                  <a:spAutoFit/>
+                </a:bodyPr>
+                <a:lstStyle/>
+                <a:p>
+                  <a:r>
+                    <a:rPr lang="de-DE" dirty="0"/>
+                    <a:t>E</a:t>
+                  </a:r>
+                </a:p>
+              </p:txBody>
+            </p:sp>
+            <p:sp>
+              <p:nvSpPr>
+                <p:cNvPr id="15" name="Textfeld 14">
+                  <a:extLst>
+                    <a:ext uri="{FF2B5EF4-FFF2-40B4-BE49-F238E27FC236}">
+                      <a16:creationId xmlns:a16="http://schemas.microsoft.com/office/drawing/2014/main" id="{0DE16CD1-A7D5-239E-8494-BB560A83E196}"/>
+                    </a:ext>
+                  </a:extLst>
+                </p:cNvPr>
+                <p:cNvSpPr txBox="1"/>
+                <p:nvPr/>
+              </p:nvSpPr>
+              <p:spPr>
+                <a:xfrm>
+                  <a:off x="7006243" y="3955072"/>
+                  <a:ext cx="295102" cy="369332"/>
+                </a:xfrm>
+                <a:prstGeom prst="rect">
+                  <a:avLst/>
+                </a:prstGeom>
+                <a:noFill/>
+              </p:spPr>
+              <p:txBody>
+                <a:bodyPr wrap="square" rtlCol="0">
+                  <a:spAutoFit/>
+                </a:bodyPr>
+                <a:lstStyle/>
+                <a:p>
+                  <a:r>
+                    <a:rPr lang="de-DE" dirty="0"/>
+                    <a:t>W</a:t>
+                  </a:r>
+                </a:p>
+              </p:txBody>
+            </p:sp>
+          </p:grpSp>
+        </p:grpSp>
+        <p:grpSp>
+          <p:nvGrpSpPr>
+            <p:cNvPr id="20" name="Gruppieren 19">
+              <a:extLst>
+                <a:ext uri="{FF2B5EF4-FFF2-40B4-BE49-F238E27FC236}">
+                  <a16:creationId xmlns:a16="http://schemas.microsoft.com/office/drawing/2014/main" id="{38F37261-4B00-0EEF-0B55-C169E9D0E696}"/>
+                </a:ext>
+              </a:extLst>
+            </p:cNvPr>
+            <p:cNvGrpSpPr/>
+            <p:nvPr/>
+          </p:nvGrpSpPr>
+          <p:grpSpPr>
+            <a:xfrm>
+              <a:off x="3553691" y="1209503"/>
+              <a:ext cx="2609503" cy="2930235"/>
+              <a:chOff x="3553691" y="1209503"/>
+              <a:chExt cx="2609503" cy="2930235"/>
+            </a:xfrm>
+          </p:grpSpPr>
+          <p:sp>
+            <p:nvSpPr>
+              <p:cNvPr id="2" name="Ellipse 1">
+                <a:extLst>
+                  <a:ext uri="{FF2B5EF4-FFF2-40B4-BE49-F238E27FC236}">
+                    <a16:creationId xmlns:a16="http://schemas.microsoft.com/office/drawing/2014/main" id="{2F8320A7-CDDA-8CB1-6F20-A683325EEFC9}"/>
+                  </a:ext>
+                </a:extLst>
+              </p:cNvPr>
+              <p:cNvSpPr/>
               <p:nvPr/>
             </p:nvSpPr>
             <p:spPr>
               <a:xfrm>
-                <a:off x="5564673" y="3637851"/>
-                <a:ext cx="175048" cy="276999"/>
+                <a:off x="3553691" y="1209503"/>
+                <a:ext cx="569422" cy="569422"/>
               </a:xfrm>
-              <a:prstGeom prst="rect">
+              <a:prstGeom prst="ellipse">
                 <a:avLst/>
               </a:prstGeom>
-              <a:blipFill>
-                <a:blip r:embed="rId2"/>
-                <a:stretch>
-                  <a:fillRect l="-34483" r="-31034" b="-26667"/>
-                </a:stretch>
-              </a:blipFill>
+              <a:solidFill>
+                <a:srgbClr val="FFFF00"/>
+              </a:solidFill>
+              <a:ln>
+                <a:solidFill>
+                  <a:schemeClr val="tx1"/>
+                </a:solidFill>
+              </a:ln>
             </p:spPr>
+            <p:style>
+              <a:lnRef idx="2">
+                <a:schemeClr val="accent1">
+                  <a:shade val="15000"/>
+                </a:schemeClr>
+              </a:lnRef>
+              <a:fillRef idx="1">
+                <a:schemeClr val="accent1"/>
+              </a:fillRef>
+              <a:effectRef idx="0">
+                <a:schemeClr val="accent1"/>
+              </a:effectRef>
+              <a:fontRef idx="minor">
+                <a:schemeClr val="lt1"/>
+              </a:fontRef>
+            </p:style>
             <p:txBody>
-              <a:bodyPr/>
+              <a:bodyPr rtlCol="0" anchor="ctr"/>
               <a:lstStyle/>
               <a:p>
-                <a:r>
-                  <a:rPr lang="de-DE">
-                    <a:noFill/>
-                  </a:rPr>
-                  <a:t> </a:t>
-                </a:r>
+                <a:pPr algn="ctr"/>
+                <a:endParaRPr lang="de-DE"/>
               </a:p>
             </p:txBody>
           </p:sp>
-        </mc:Fallback>
-      </mc:AlternateContent>
-      <mc:AlternateContent xmlns:mc="http://schemas.openxmlformats.org/markup-compatibility/2006" xmlns:a14="http://schemas.microsoft.com/office/drawing/2010/main">
-        <mc:Choice Requires="a14">
-          <p:sp>
-            <p:nvSpPr>
-              <p:cNvPr id="33" name="Textfeld 32">
+          <p:grpSp>
+            <p:nvGrpSpPr>
+              <p:cNvPr id="19" name="Gruppieren 18">
                 <a:extLst>
                   <a:ext uri="{FF2B5EF4-FFF2-40B4-BE49-F238E27FC236}">
-                    <a16:creationId xmlns:a16="http://schemas.microsoft.com/office/drawing/2014/main" id="{21D38EF4-5B94-B5B6-61A2-486A72794A40}"/>
+                    <a16:creationId xmlns:a16="http://schemas.microsoft.com/office/drawing/2014/main" id="{271CC1CD-7320-2853-7EC1-D13D270B22B6}"/>
                   </a:ext>
                 </a:extLst>
               </p:cNvPr>
-              <p:cNvSpPr txBox="1"/>
+              <p:cNvGrpSpPr/>
+              <p:nvPr/>
+            </p:nvGrpSpPr>
+            <p:grpSpPr>
+              <a:xfrm>
+                <a:off x="3838402" y="1508760"/>
+                <a:ext cx="2324792" cy="2630978"/>
+                <a:chOff x="3838402" y="1508760"/>
+                <a:chExt cx="2324792" cy="2630978"/>
+              </a:xfrm>
+            </p:grpSpPr>
+            <p:cxnSp>
+              <p:nvCxnSpPr>
+                <p:cNvPr id="17" name="Gerader Verbinder 16">
+                  <a:extLst>
+                    <a:ext uri="{FF2B5EF4-FFF2-40B4-BE49-F238E27FC236}">
+                      <a16:creationId xmlns:a16="http://schemas.microsoft.com/office/drawing/2014/main" id="{B347C1D2-454B-8C88-64CE-C3934580D2AB}"/>
+                    </a:ext>
+                  </a:extLst>
+                </p:cNvPr>
+                <p:cNvCxnSpPr>
+                  <a:stCxn id="2" idx="4"/>
+                </p:cNvCxnSpPr>
+                <p:nvPr/>
+              </p:nvCxnSpPr>
+              <p:spPr>
+                <a:xfrm>
+                  <a:off x="3838402" y="1778925"/>
+                  <a:ext cx="0" cy="1613252"/>
+                </a:xfrm>
+                <a:prstGeom prst="line">
+                  <a:avLst/>
+                </a:prstGeom>
+                <a:ln>
+                  <a:solidFill>
+                    <a:schemeClr val="tx1"/>
+                  </a:solidFill>
+                  <a:prstDash val="lgDashDot"/>
+                </a:ln>
+              </p:spPr>
+              <p:style>
+                <a:lnRef idx="2">
+                  <a:schemeClr val="accent1"/>
+                </a:lnRef>
+                <a:fillRef idx="0">
+                  <a:schemeClr val="accent1"/>
+                </a:fillRef>
+                <a:effectRef idx="1">
+                  <a:schemeClr val="accent1"/>
+                </a:effectRef>
+                <a:fontRef idx="minor">
+                  <a:schemeClr val="tx1"/>
+                </a:fontRef>
+              </p:style>
+            </p:cxnSp>
+            <p:cxnSp>
+              <p:nvCxnSpPr>
+                <p:cNvPr id="18" name="Gerader Verbinder 17">
+                  <a:extLst>
+                    <a:ext uri="{FF2B5EF4-FFF2-40B4-BE49-F238E27FC236}">
+                      <a16:creationId xmlns:a16="http://schemas.microsoft.com/office/drawing/2014/main" id="{D05F7CDE-FB15-4F8A-0663-42C3793505E5}"/>
+                    </a:ext>
+                  </a:extLst>
+                </p:cNvPr>
+                <p:cNvCxnSpPr>
+                  <a:cxnSpLocks/>
+                </p:cNvCxnSpPr>
+                <p:nvPr/>
+              </p:nvCxnSpPr>
+              <p:spPr>
+                <a:xfrm>
+                  <a:off x="3838402" y="1508760"/>
+                  <a:ext cx="2324792" cy="2630978"/>
+                </a:xfrm>
+                <a:prstGeom prst="line">
+                  <a:avLst/>
+                </a:prstGeom>
+                <a:ln>
+                  <a:solidFill>
+                    <a:schemeClr val="tx1"/>
+                  </a:solidFill>
+                  <a:prstDash val="lgDashDot"/>
+                </a:ln>
+              </p:spPr>
+              <p:style>
+                <a:lnRef idx="2">
+                  <a:schemeClr val="accent1"/>
+                </a:lnRef>
+                <a:fillRef idx="0">
+                  <a:schemeClr val="accent1"/>
+                </a:fillRef>
+                <a:effectRef idx="1">
+                  <a:schemeClr val="accent1"/>
+                </a:effectRef>
+                <a:fontRef idx="minor">
+                  <a:schemeClr val="tx1"/>
+                </a:fontRef>
+              </p:style>
+            </p:cxnSp>
+            <p:cxnSp>
+              <p:nvCxnSpPr>
+                <p:cNvPr id="21" name="Gerader Verbinder 20">
+                  <a:extLst>
+                    <a:ext uri="{FF2B5EF4-FFF2-40B4-BE49-F238E27FC236}">
+                      <a16:creationId xmlns:a16="http://schemas.microsoft.com/office/drawing/2014/main" id="{C16BAC41-3F24-6BDB-03C0-6540C7A10DF0}"/>
+                    </a:ext>
+                  </a:extLst>
+                </p:cNvPr>
+                <p:cNvCxnSpPr>
+                  <a:cxnSpLocks/>
+                </p:cNvCxnSpPr>
+                <p:nvPr/>
+              </p:nvCxnSpPr>
+              <p:spPr>
+                <a:xfrm>
+                  <a:off x="3847928" y="3392177"/>
+                  <a:ext cx="2315266" cy="747561"/>
+                </a:xfrm>
+                <a:prstGeom prst="line">
+                  <a:avLst/>
+                </a:prstGeom>
+                <a:ln>
+                  <a:solidFill>
+                    <a:schemeClr val="tx1"/>
+                  </a:solidFill>
+                  <a:prstDash val="lgDashDot"/>
+                </a:ln>
+              </p:spPr>
+              <p:style>
+                <a:lnRef idx="2">
+                  <a:schemeClr val="accent1"/>
+                </a:lnRef>
+                <a:fillRef idx="0">
+                  <a:schemeClr val="accent1"/>
+                </a:fillRef>
+                <a:effectRef idx="1">
+                  <a:schemeClr val="accent1"/>
+                </a:effectRef>
+                <a:fontRef idx="minor">
+                  <a:schemeClr val="tx1"/>
+                </a:fontRef>
+              </p:style>
+            </p:cxnSp>
+            <p:cxnSp>
+              <p:nvCxnSpPr>
+                <p:cNvPr id="30" name="Gerade Verbindung mit Pfeil 29">
+                  <a:extLst>
+                    <a:ext uri="{FF2B5EF4-FFF2-40B4-BE49-F238E27FC236}">
+                      <a16:creationId xmlns:a16="http://schemas.microsoft.com/office/drawing/2014/main" id="{5EE88F29-F2E0-BB42-26B0-62D6AB57F7BA}"/>
+                    </a:ext>
+                  </a:extLst>
+                </p:cNvPr>
+                <p:cNvCxnSpPr>
+                  <a:cxnSpLocks/>
+                </p:cNvCxnSpPr>
+                <p:nvPr/>
+              </p:nvCxnSpPr>
+              <p:spPr>
+                <a:xfrm flipH="1" flipV="1">
+                  <a:off x="5329709" y="3210567"/>
+                  <a:ext cx="820023" cy="910243"/>
+                </a:xfrm>
+                <a:prstGeom prst="straightConnector1">
+                  <a:avLst/>
+                </a:prstGeom>
+                <a:ln>
+                  <a:solidFill>
+                    <a:srgbClr val="FF0000"/>
+                  </a:solidFill>
+                  <a:tailEnd type="triangle"/>
+                </a:ln>
+              </p:spPr>
+              <p:style>
+                <a:lnRef idx="2">
+                  <a:schemeClr val="accent1"/>
+                </a:lnRef>
+                <a:fillRef idx="0">
+                  <a:schemeClr val="accent1"/>
+                </a:fillRef>
+                <a:effectRef idx="1">
+                  <a:schemeClr val="accent1"/>
+                </a:effectRef>
+                <a:fontRef idx="minor">
+                  <a:schemeClr val="tx1"/>
+                </a:fontRef>
+              </p:style>
+            </p:cxnSp>
+          </p:grpSp>
+        </p:grpSp>
+        <p:grpSp>
+          <p:nvGrpSpPr>
+            <p:cNvPr id="11" name="Gruppieren 10">
+              <a:extLst>
+                <a:ext uri="{FF2B5EF4-FFF2-40B4-BE49-F238E27FC236}">
+                  <a16:creationId xmlns:a16="http://schemas.microsoft.com/office/drawing/2014/main" id="{691F56E9-ADEE-510A-FF29-321089652F41}"/>
+                </a:ext>
+              </a:extLst>
+            </p:cNvPr>
+            <p:cNvGrpSpPr/>
+            <p:nvPr/>
+          </p:nvGrpSpPr>
+          <p:grpSpPr>
+            <a:xfrm>
+              <a:off x="5498872" y="3196244"/>
+              <a:ext cx="1328644" cy="1886988"/>
+              <a:chOff x="5498872" y="3196244"/>
+              <a:chExt cx="1328644" cy="1886988"/>
+            </a:xfrm>
+          </p:grpSpPr>
+          <p:sp>
+            <p:nvSpPr>
+              <p:cNvPr id="28" name="Bogen 27">
+                <a:extLst>
+                  <a:ext uri="{FF2B5EF4-FFF2-40B4-BE49-F238E27FC236}">
+                    <a16:creationId xmlns:a16="http://schemas.microsoft.com/office/drawing/2014/main" id="{F533D56D-48D7-BE53-0A6F-13DE00B5DE6D}"/>
+                  </a:ext>
+                </a:extLst>
+              </p:cNvPr>
+              <p:cNvSpPr/>
               <p:nvPr/>
             </p:nvSpPr>
             <p:spPr>
-              <a:xfrm>
-                <a:off x="5883541" y="4080209"/>
-                <a:ext cx="191334" cy="276999"/>
+              <a:xfrm rot="16200000">
+                <a:off x="5219700" y="3475416"/>
+                <a:ext cx="1886988" cy="1328644"/>
               </a:xfrm>
-              <a:prstGeom prst="rect">
-                <a:avLst/>
+              <a:prstGeom prst="arc">
+                <a:avLst>
+                  <a:gd name="adj1" fmla="val 17166077"/>
+                  <a:gd name="adj2" fmla="val 19199777"/>
+                </a:avLst>
               </a:prstGeom>
-              <a:noFill/>
+              <a:ln>
+                <a:solidFill>
+                  <a:schemeClr val="tx1"/>
+                </a:solidFill>
+              </a:ln>
             </p:spPr>
+            <p:style>
+              <a:lnRef idx="2">
+                <a:schemeClr val="accent1"/>
+              </a:lnRef>
+              <a:fillRef idx="0">
+                <a:schemeClr val="accent1"/>
+              </a:fillRef>
+              <a:effectRef idx="1">
+                <a:schemeClr val="accent1"/>
+              </a:effectRef>
+              <a:fontRef idx="minor">
+                <a:schemeClr val="tx1"/>
+              </a:fontRef>
+            </p:style>
             <p:txBody>
-              <a:bodyPr wrap="none" lIns="0" tIns="0" rIns="0" bIns="0" rtlCol="0">
-                <a:spAutoFit/>
-              </a:bodyPr>
+              <a:bodyPr rtlCol="0" anchor="ctr"/>
               <a:lstStyle/>
               <a:p>
-                <a:pPr/>
-                <a14:m>
-                  <m:oMathPara xmlns:m="http://schemas.openxmlformats.org/officeDocument/2006/math">
-                    <m:oMathParaPr>
-                      <m:jc m:val="centerGroup"/>
-                    </m:oMathParaPr>
-                    <m:oMath xmlns:m="http://schemas.openxmlformats.org/officeDocument/2006/math">
-                      <m:r>
-                        <a:rPr lang="de-DE" b="0" i="1" smtClean="0">
-                          <a:latin typeface="Cambria Math" panose="02040503050406030204" pitchFamily="18" charset="0"/>
-                        </a:rPr>
-                        <m:t>𝛼</m:t>
-                      </m:r>
-                    </m:oMath>
-                  </m:oMathPara>
-                </a14:m>
-                <a:endParaRPr lang="de-DE" b="0" dirty="0"/>
+                <a:pPr algn="ctr"/>
+                <a:endParaRPr lang="de-DE"/>
               </a:p>
             </p:txBody>
           </p:sp>
-        </mc:Choice>
-        <mc:Fallback xmlns="">
+          <mc:AlternateContent xmlns:mc="http://schemas.openxmlformats.org/markup-compatibility/2006">
+            <mc:Choice xmlns:a14="http://schemas.microsoft.com/office/drawing/2010/main" Requires="a14">
+              <p:sp>
+                <p:nvSpPr>
+                  <p:cNvPr id="31" name="Textfeld 30">
+                    <a:extLst>
+                      <a:ext uri="{FF2B5EF4-FFF2-40B4-BE49-F238E27FC236}">
+                        <a16:creationId xmlns:a16="http://schemas.microsoft.com/office/drawing/2014/main" id="{72CD5F8A-0203-51A8-F3EF-DA5C5A37A6CC}"/>
+                      </a:ext>
+                    </a:extLst>
+                  </p:cNvPr>
+                  <p:cNvSpPr txBox="1"/>
+                  <p:nvPr/>
+                </p:nvSpPr>
+                <p:spPr>
+                  <a:xfrm>
+                    <a:off x="5564673" y="3637851"/>
+                    <a:ext cx="175048" cy="276999"/>
+                  </a:xfrm>
+                  <a:prstGeom prst="rect">
+                    <a:avLst/>
+                  </a:prstGeom>
+                  <a:noFill/>
+                </p:spPr>
+                <p:txBody>
+                  <a:bodyPr wrap="none" lIns="0" tIns="0" rIns="0" bIns="0" rtlCol="0">
+                    <a:spAutoFit/>
+                  </a:bodyPr>
+                  <a:lstStyle/>
+                  <a:p>
+                    <a:pPr/>
+                    <a14:m>
+                      <m:oMathPara xmlns:m="http://schemas.openxmlformats.org/officeDocument/2006/math">
+                        <m:oMathParaPr>
+                          <m:jc m:val="centerGroup"/>
+                        </m:oMathParaPr>
+                        <m:oMath xmlns:m="http://schemas.openxmlformats.org/officeDocument/2006/math">
+                          <m:r>
+                            <a:rPr lang="de-DE" b="0" i="1" smtClean="0">
+                              <a:latin typeface="Cambria Math" panose="02040503050406030204" pitchFamily="18" charset="0"/>
+                            </a:rPr>
+                            <m:t>𝜂</m:t>
+                          </m:r>
+                        </m:oMath>
+                      </m:oMathPara>
+                    </a14:m>
+                    <a:endParaRPr lang="de-DE" b="0" dirty="0"/>
+                  </a:p>
+                </p:txBody>
+              </p:sp>
+            </mc:Choice>
+            <mc:Fallback>
+              <p:sp>
+                <p:nvSpPr>
+                  <p:cNvPr id="31" name="Textfeld 30">
+                    <a:extLst>
+                      <a:ext uri="{FF2B5EF4-FFF2-40B4-BE49-F238E27FC236}">
+                        <a16:creationId xmlns:a16="http://schemas.microsoft.com/office/drawing/2014/main" id="{72CD5F8A-0203-51A8-F3EF-DA5C5A37A6CC}"/>
+                      </a:ext>
+                    </a:extLst>
+                  </p:cNvPr>
+                  <p:cNvSpPr txBox="1">
+                    <a:spLocks noRot="1" noChangeAspect="1" noMove="1" noResize="1" noEditPoints="1" noAdjustHandles="1" noChangeArrowheads="1" noChangeShapeType="1" noTextEdit="1"/>
+                  </p:cNvSpPr>
+                  <p:nvPr/>
+                </p:nvSpPr>
+                <p:spPr>
+                  <a:xfrm>
+                    <a:off x="5564673" y="3637851"/>
+                    <a:ext cx="175048" cy="276999"/>
+                  </a:xfrm>
+                  <a:prstGeom prst="rect">
+                    <a:avLst/>
+                  </a:prstGeom>
+                  <a:blipFill>
+                    <a:blip r:embed="rId2"/>
+                    <a:stretch>
+                      <a:fillRect l="-34483" r="-31034" b="-26667"/>
+                    </a:stretch>
+                  </a:blipFill>
+                </p:spPr>
+                <p:txBody>
+                  <a:bodyPr/>
+                  <a:lstStyle/>
+                  <a:p>
+                    <a:r>
+                      <a:rPr lang="de-DE">
+                        <a:noFill/>
+                      </a:rPr>
+                      <a:t> </a:t>
+                    </a:r>
+                  </a:p>
+                </p:txBody>
+              </p:sp>
+            </mc:Fallback>
+          </mc:AlternateContent>
+        </p:grpSp>
+        <p:grpSp>
+          <p:nvGrpSpPr>
+            <p:cNvPr id="9" name="Gruppieren 8">
+              <a:extLst>
+                <a:ext uri="{FF2B5EF4-FFF2-40B4-BE49-F238E27FC236}">
+                  <a16:creationId xmlns:a16="http://schemas.microsoft.com/office/drawing/2014/main" id="{184978A6-9ACD-6BEE-7415-480F0058EE22}"/>
+                </a:ext>
+              </a:extLst>
+            </p:cNvPr>
+            <p:cNvGrpSpPr/>
+            <p:nvPr/>
+          </p:nvGrpSpPr>
+          <p:grpSpPr>
+            <a:xfrm>
+              <a:off x="5320848" y="3840480"/>
+              <a:ext cx="1684692" cy="598516"/>
+              <a:chOff x="5320848" y="3840480"/>
+              <a:chExt cx="1684692" cy="598516"/>
+            </a:xfrm>
+          </p:grpSpPr>
           <p:sp>
             <p:nvSpPr>
-              <p:cNvPr id="33" name="Textfeld 32">
+              <p:cNvPr id="26" name="Bogen 25">
                 <a:extLst>
                   <a:ext uri="{FF2B5EF4-FFF2-40B4-BE49-F238E27FC236}">
-                    <a16:creationId xmlns:a16="http://schemas.microsoft.com/office/drawing/2014/main" id="{21D38EF4-5B94-B5B6-61A2-486A72794A40}"/>
+                    <a16:creationId xmlns:a16="http://schemas.microsoft.com/office/drawing/2014/main" id="{D434DA83-A2FA-637A-ED2A-C157BB3CD026}"/>
                   </a:ext>
                 </a:extLst>
               </p:cNvPr>
-              <p:cNvSpPr txBox="1">
-                <a:spLocks noRot="1" noChangeAspect="1" noMove="1" noResize="1" noEditPoints="1" noAdjustHandles="1" noChangeArrowheads="1" noChangeShapeType="1" noTextEdit="1"/>
-              </p:cNvSpPr>
+              <p:cNvSpPr/>
               <p:nvPr/>
             </p:nvSpPr>
             <p:spPr>
-              <a:xfrm>
-                <a:off x="5883541" y="4080209"/>
-                <a:ext cx="191334" cy="276999"/>
+              <a:xfrm rot="10800000">
+                <a:off x="5320848" y="3840480"/>
+                <a:ext cx="1684692" cy="598516"/>
               </a:xfrm>
-              <a:prstGeom prst="rect">
-                <a:avLst/>
+              <a:prstGeom prst="arc">
+                <a:avLst>
+                  <a:gd name="adj1" fmla="val 16200000"/>
+                  <a:gd name="adj2" fmla="val 1050638"/>
+                </a:avLst>
               </a:prstGeom>
-              <a:blipFill>
-                <a:blip r:embed="rId3"/>
-                <a:stretch>
-                  <a:fillRect l="-18750" r="-15625"/>
-                </a:stretch>
-              </a:blipFill>
+              <a:ln>
+                <a:solidFill>
+                  <a:schemeClr val="tx1"/>
+                </a:solidFill>
+                <a:prstDash val="solid"/>
+              </a:ln>
             </p:spPr>
+            <p:style>
+              <a:lnRef idx="2">
+                <a:schemeClr val="accent1"/>
+              </a:lnRef>
+              <a:fillRef idx="0">
+                <a:schemeClr val="accent1"/>
+              </a:fillRef>
+              <a:effectRef idx="1">
+                <a:schemeClr val="accent1"/>
+              </a:effectRef>
+              <a:fontRef idx="minor">
+                <a:schemeClr val="tx1"/>
+              </a:fontRef>
+            </p:style>
             <p:txBody>
-              <a:bodyPr/>
+              <a:bodyPr rtlCol="0" anchor="ctr"/>
               <a:lstStyle/>
               <a:p>
-                <a:r>
-                  <a:rPr lang="de-DE">
-                    <a:noFill/>
-                  </a:rPr>
-                  <a:t> </a:t>
-                </a:r>
+                <a:pPr algn="ctr"/>
+                <a:endParaRPr lang="de-DE"/>
               </a:p>
             </p:txBody>
           </p:sp>
-        </mc:Fallback>
-      </mc:AlternateContent>
+          <mc:AlternateContent xmlns:mc="http://schemas.openxmlformats.org/markup-compatibility/2006">
+            <mc:Choice xmlns:a14="http://schemas.microsoft.com/office/drawing/2010/main" Requires="a14">
+              <p:sp>
+                <p:nvSpPr>
+                  <p:cNvPr id="33" name="Textfeld 32">
+                    <a:extLst>
+                      <a:ext uri="{FF2B5EF4-FFF2-40B4-BE49-F238E27FC236}">
+                        <a16:creationId xmlns:a16="http://schemas.microsoft.com/office/drawing/2014/main" id="{21D38EF4-5B94-B5B6-61A2-486A72794A40}"/>
+                      </a:ext>
+                    </a:extLst>
+                  </p:cNvPr>
+                  <p:cNvSpPr txBox="1"/>
+                  <p:nvPr/>
+                </p:nvSpPr>
+                <p:spPr>
+                  <a:xfrm>
+                    <a:off x="5883541" y="4080209"/>
+                    <a:ext cx="191334" cy="276999"/>
+                  </a:xfrm>
+                  <a:prstGeom prst="rect">
+                    <a:avLst/>
+                  </a:prstGeom>
+                  <a:noFill/>
+                </p:spPr>
+                <p:txBody>
+                  <a:bodyPr wrap="none" lIns="0" tIns="0" rIns="0" bIns="0" rtlCol="0">
+                    <a:spAutoFit/>
+                  </a:bodyPr>
+                  <a:lstStyle/>
+                  <a:p>
+                    <a:pPr/>
+                    <a14:m>
+                      <m:oMathPara xmlns:m="http://schemas.openxmlformats.org/officeDocument/2006/math">
+                        <m:oMathParaPr>
+                          <m:jc m:val="centerGroup"/>
+                        </m:oMathParaPr>
+                        <m:oMath xmlns:m="http://schemas.openxmlformats.org/officeDocument/2006/math">
+                          <m:r>
+                            <a:rPr lang="de-DE" b="0" i="1" smtClean="0">
+                              <a:latin typeface="Cambria Math" panose="02040503050406030204" pitchFamily="18" charset="0"/>
+                            </a:rPr>
+                            <m:t>𝛼</m:t>
+                          </m:r>
+                        </m:oMath>
+                      </m:oMathPara>
+                    </a14:m>
+                    <a:endParaRPr lang="de-DE" b="0" dirty="0"/>
+                  </a:p>
+                </p:txBody>
+              </p:sp>
+            </mc:Choice>
+            <mc:Fallback>
+              <p:sp>
+                <p:nvSpPr>
+                  <p:cNvPr id="33" name="Textfeld 32">
+                    <a:extLst>
+                      <a:ext uri="{FF2B5EF4-FFF2-40B4-BE49-F238E27FC236}">
+                        <a16:creationId xmlns:a16="http://schemas.microsoft.com/office/drawing/2014/main" id="{21D38EF4-5B94-B5B6-61A2-486A72794A40}"/>
+                      </a:ext>
+                    </a:extLst>
+                  </p:cNvPr>
+                  <p:cNvSpPr txBox="1">
+                    <a:spLocks noRot="1" noChangeAspect="1" noMove="1" noResize="1" noEditPoints="1" noAdjustHandles="1" noChangeArrowheads="1" noChangeShapeType="1" noTextEdit="1"/>
+                  </p:cNvSpPr>
+                  <p:nvPr/>
+                </p:nvSpPr>
+                <p:spPr>
+                  <a:xfrm>
+                    <a:off x="5883541" y="4080209"/>
+                    <a:ext cx="191334" cy="276999"/>
+                  </a:xfrm>
+                  <a:prstGeom prst="rect">
+                    <a:avLst/>
+                  </a:prstGeom>
+                  <a:blipFill>
+                    <a:blip r:embed="rId3"/>
+                    <a:stretch>
+                      <a:fillRect l="-18750" r="-15625"/>
+                    </a:stretch>
+                  </a:blipFill>
+                </p:spPr>
+                <p:txBody>
+                  <a:bodyPr/>
+                  <a:lstStyle/>
+                  <a:p>
+                    <a:r>
+                      <a:rPr lang="de-DE">
+                        <a:noFill/>
+                      </a:rPr>
+                      <a:t> </a:t>
+                    </a:r>
+                  </a:p>
+                </p:txBody>
+              </p:sp>
+            </mc:Fallback>
+          </mc:AlternateContent>
+        </p:grpSp>
+      </p:grpSp>
     </p:spTree>
     <p:extLst>
       <p:ext uri="{BB962C8B-B14F-4D97-AF65-F5344CB8AC3E}">
@@ -5875,6 +6024,1703 @@
 </file>
 
 <file path=ppt/slides/slide4.xml><?xml version="1.0" encoding="utf-8"?>
+<p:sld xmlns:a="http://schemas.openxmlformats.org/drawingml/2006/main" xmlns:r="http://schemas.openxmlformats.org/officeDocument/2006/relationships" xmlns:p="http://schemas.openxmlformats.org/presentationml/2006/main">
+  <p:cSld>
+    <p:spTree>
+      <p:nvGrpSpPr>
+        <p:cNvPr id="1" name=""/>
+        <p:cNvGrpSpPr/>
+        <p:nvPr/>
+      </p:nvGrpSpPr>
+      <p:grpSpPr>
+        <a:xfrm>
+          <a:off x="0" y="0"/>
+          <a:ext cx="0" cy="0"/>
+          <a:chOff x="0" y="0"/>
+          <a:chExt cx="0" cy="0"/>
+        </a:xfrm>
+      </p:grpSpPr>
+      <p:grpSp>
+        <p:nvGrpSpPr>
+          <p:cNvPr id="27" name="Gruppieren 26">
+            <a:extLst>
+              <a:ext uri="{FF2B5EF4-FFF2-40B4-BE49-F238E27FC236}">
+                <a16:creationId xmlns:a16="http://schemas.microsoft.com/office/drawing/2014/main" id="{A2829BF1-C0D3-5B52-54EE-BB1E79B8AAE3}"/>
+              </a:ext>
+            </a:extLst>
+          </p:cNvPr>
+          <p:cNvGrpSpPr/>
+          <p:nvPr/>
+        </p:nvGrpSpPr>
+        <p:grpSpPr>
+          <a:xfrm>
+            <a:off x="1720735" y="2472690"/>
+            <a:ext cx="2286000" cy="2281844"/>
+            <a:chOff x="5012575" y="1600200"/>
+            <a:chExt cx="2286000" cy="2281844"/>
+          </a:xfrm>
+        </p:grpSpPr>
+        <p:grpSp>
+          <p:nvGrpSpPr>
+            <p:cNvPr id="25" name="Gruppieren 24">
+              <a:extLst>
+                <a:ext uri="{FF2B5EF4-FFF2-40B4-BE49-F238E27FC236}">
+                  <a16:creationId xmlns:a16="http://schemas.microsoft.com/office/drawing/2014/main" id="{27E91692-F8AA-8C9E-5014-F7A8583423E2}"/>
+                </a:ext>
+              </a:extLst>
+            </p:cNvPr>
+            <p:cNvGrpSpPr/>
+            <p:nvPr/>
+          </p:nvGrpSpPr>
+          <p:grpSpPr>
+            <a:xfrm>
+              <a:off x="5843847" y="1600200"/>
+              <a:ext cx="1454728" cy="2281844"/>
+              <a:chOff x="5843847" y="1600200"/>
+              <a:chExt cx="1454728" cy="2281844"/>
+            </a:xfrm>
+          </p:grpSpPr>
+          <p:cxnSp>
+            <p:nvCxnSpPr>
+              <p:cNvPr id="3" name="Gerade Verbindung mit Pfeil 2">
+                <a:extLst>
+                  <a:ext uri="{FF2B5EF4-FFF2-40B4-BE49-F238E27FC236}">
+                    <a16:creationId xmlns:a16="http://schemas.microsoft.com/office/drawing/2014/main" id="{16FCD6EE-DECB-45D0-449D-33090E883CB8}"/>
+                  </a:ext>
+                </a:extLst>
+              </p:cNvPr>
+              <p:cNvCxnSpPr>
+                <a:cxnSpLocks/>
+              </p:cNvCxnSpPr>
+              <p:nvPr/>
+            </p:nvCxnSpPr>
+            <p:spPr>
+              <a:xfrm>
+                <a:off x="5843847" y="3108960"/>
+                <a:ext cx="1209502" cy="773084"/>
+              </a:xfrm>
+              <a:prstGeom prst="straightConnector1">
+                <a:avLst/>
+              </a:prstGeom>
+              <a:ln>
+                <a:solidFill>
+                  <a:schemeClr val="accent5"/>
+                </a:solidFill>
+                <a:tailEnd type="triangle"/>
+              </a:ln>
+            </p:spPr>
+            <p:style>
+              <a:lnRef idx="2">
+                <a:schemeClr val="accent1"/>
+              </a:lnRef>
+              <a:fillRef idx="0">
+                <a:schemeClr val="accent1"/>
+              </a:fillRef>
+              <a:effectRef idx="1">
+                <a:schemeClr val="accent1"/>
+              </a:effectRef>
+              <a:fontRef idx="minor">
+                <a:schemeClr val="tx1"/>
+              </a:fontRef>
+            </p:style>
+          </p:cxnSp>
+          <p:cxnSp>
+            <p:nvCxnSpPr>
+              <p:cNvPr id="4" name="Gerade Verbindung mit Pfeil 3">
+                <a:extLst>
+                  <a:ext uri="{FF2B5EF4-FFF2-40B4-BE49-F238E27FC236}">
+                    <a16:creationId xmlns:a16="http://schemas.microsoft.com/office/drawing/2014/main" id="{58CDBAE6-D845-C8D6-0DBF-3E619FCA8048}"/>
+                  </a:ext>
+                </a:extLst>
+              </p:cNvPr>
+              <p:cNvCxnSpPr>
+                <a:cxnSpLocks/>
+              </p:cNvCxnSpPr>
+              <p:nvPr/>
+            </p:nvCxnSpPr>
+            <p:spPr>
+              <a:xfrm flipV="1">
+                <a:off x="5843847" y="2872047"/>
+                <a:ext cx="1454728" cy="239684"/>
+              </a:xfrm>
+              <a:prstGeom prst="straightConnector1">
+                <a:avLst/>
+              </a:prstGeom>
+              <a:ln>
+                <a:solidFill>
+                  <a:srgbClr val="00B050"/>
+                </a:solidFill>
+                <a:tailEnd type="triangle"/>
+              </a:ln>
+            </p:spPr>
+            <p:style>
+              <a:lnRef idx="2">
+                <a:schemeClr val="accent1"/>
+              </a:lnRef>
+              <a:fillRef idx="0">
+                <a:schemeClr val="accent1"/>
+              </a:fillRef>
+              <a:effectRef idx="1">
+                <a:schemeClr val="accent1"/>
+              </a:effectRef>
+              <a:fontRef idx="minor">
+                <a:schemeClr val="tx1"/>
+              </a:fontRef>
+            </p:style>
+          </p:cxnSp>
+          <p:cxnSp>
+            <p:nvCxnSpPr>
+              <p:cNvPr id="11" name="Gerade Verbindung mit Pfeil 10">
+                <a:extLst>
+                  <a:ext uri="{FF2B5EF4-FFF2-40B4-BE49-F238E27FC236}">
+                    <a16:creationId xmlns:a16="http://schemas.microsoft.com/office/drawing/2014/main" id="{95D79F94-C2A7-00FF-41CD-696339A3ACA0}"/>
+                  </a:ext>
+                </a:extLst>
+              </p:cNvPr>
+              <p:cNvCxnSpPr>
+                <a:cxnSpLocks/>
+              </p:cNvCxnSpPr>
+              <p:nvPr/>
+            </p:nvCxnSpPr>
+            <p:spPr>
+              <a:xfrm flipV="1">
+                <a:off x="5843847" y="1600200"/>
+                <a:ext cx="0" cy="1508760"/>
+              </a:xfrm>
+              <a:prstGeom prst="straightConnector1">
+                <a:avLst/>
+              </a:prstGeom>
+              <a:ln>
+                <a:solidFill>
+                  <a:srgbClr val="0070C0"/>
+                </a:solidFill>
+                <a:tailEnd type="triangle"/>
+              </a:ln>
+            </p:spPr>
+            <p:style>
+              <a:lnRef idx="2">
+                <a:schemeClr val="accent1"/>
+              </a:lnRef>
+              <a:fillRef idx="0">
+                <a:schemeClr val="accent1"/>
+              </a:fillRef>
+              <a:effectRef idx="1">
+                <a:schemeClr val="accent1"/>
+              </a:effectRef>
+              <a:fontRef idx="minor">
+                <a:schemeClr val="tx1"/>
+              </a:fontRef>
+            </p:style>
+          </p:cxnSp>
+        </p:grpSp>
+        <p:grpSp>
+          <p:nvGrpSpPr>
+            <p:cNvPr id="26" name="Gruppieren 25">
+              <a:extLst>
+                <a:ext uri="{FF2B5EF4-FFF2-40B4-BE49-F238E27FC236}">
+                  <a16:creationId xmlns:a16="http://schemas.microsoft.com/office/drawing/2014/main" id="{154786EF-8AD8-6A76-ACDB-BB889B4B6844}"/>
+                </a:ext>
+              </a:extLst>
+            </p:cNvPr>
+            <p:cNvGrpSpPr/>
+            <p:nvPr/>
+          </p:nvGrpSpPr>
+          <p:grpSpPr>
+            <a:xfrm>
+              <a:off x="5012575" y="1716578"/>
+              <a:ext cx="1500446" cy="2061557"/>
+              <a:chOff x="5012575" y="1716578"/>
+              <a:chExt cx="1500446" cy="2061557"/>
+            </a:xfrm>
+          </p:grpSpPr>
+          <p:cxnSp>
+            <p:nvCxnSpPr>
+              <p:cNvPr id="15" name="Gerade Verbindung mit Pfeil 14">
+                <a:extLst>
+                  <a:ext uri="{FF2B5EF4-FFF2-40B4-BE49-F238E27FC236}">
+                    <a16:creationId xmlns:a16="http://schemas.microsoft.com/office/drawing/2014/main" id="{728FBFC1-EEE6-AD67-CB07-3CAE959CDA08}"/>
+                  </a:ext>
+                </a:extLst>
+              </p:cNvPr>
+              <p:cNvCxnSpPr>
+                <a:cxnSpLocks/>
+              </p:cNvCxnSpPr>
+              <p:nvPr/>
+            </p:nvCxnSpPr>
+            <p:spPr>
+              <a:xfrm flipH="1" flipV="1">
+                <a:off x="5012575" y="2007524"/>
+                <a:ext cx="831272" cy="1101436"/>
+              </a:xfrm>
+              <a:prstGeom prst="straightConnector1">
+                <a:avLst/>
+              </a:prstGeom>
+              <a:ln>
+                <a:solidFill>
+                  <a:srgbClr val="FF0000"/>
+                </a:solidFill>
+                <a:tailEnd type="triangle"/>
+              </a:ln>
+            </p:spPr>
+            <p:style>
+              <a:lnRef idx="2">
+                <a:schemeClr val="accent1"/>
+              </a:lnRef>
+              <a:fillRef idx="0">
+                <a:schemeClr val="accent1"/>
+              </a:fillRef>
+              <a:effectRef idx="1">
+                <a:schemeClr val="accent1"/>
+              </a:effectRef>
+              <a:fontRef idx="minor">
+                <a:schemeClr val="tx1"/>
+              </a:fontRef>
+            </p:style>
+          </p:cxnSp>
+          <p:cxnSp>
+            <p:nvCxnSpPr>
+              <p:cNvPr id="18" name="Gerade Verbindung mit Pfeil 17">
+                <a:extLst>
+                  <a:ext uri="{FF2B5EF4-FFF2-40B4-BE49-F238E27FC236}">
+                    <a16:creationId xmlns:a16="http://schemas.microsoft.com/office/drawing/2014/main" id="{79E1F54C-B707-65FC-8403-A32AA1DF14C9}"/>
+                  </a:ext>
+                </a:extLst>
+              </p:cNvPr>
+              <p:cNvCxnSpPr>
+                <a:cxnSpLocks/>
+              </p:cNvCxnSpPr>
+              <p:nvPr/>
+            </p:nvCxnSpPr>
+            <p:spPr>
+              <a:xfrm flipH="1" flipV="1">
+                <a:off x="5478087" y="1716578"/>
+                <a:ext cx="365759" cy="1392382"/>
+              </a:xfrm>
+              <a:prstGeom prst="straightConnector1">
+                <a:avLst/>
+              </a:prstGeom>
+              <a:ln>
+                <a:solidFill>
+                  <a:srgbClr val="FF0000"/>
+                </a:solidFill>
+                <a:tailEnd type="triangle"/>
+              </a:ln>
+            </p:spPr>
+            <p:style>
+              <a:lnRef idx="2">
+                <a:schemeClr val="accent1"/>
+              </a:lnRef>
+              <a:fillRef idx="0">
+                <a:schemeClr val="accent1"/>
+              </a:fillRef>
+              <a:effectRef idx="1">
+                <a:schemeClr val="accent1"/>
+              </a:effectRef>
+              <a:fontRef idx="minor">
+                <a:schemeClr val="tx1"/>
+              </a:fontRef>
+            </p:style>
+          </p:cxnSp>
+          <p:sp>
+            <p:nvSpPr>
+              <p:cNvPr id="23" name="Bogen 22">
+                <a:extLst>
+                  <a:ext uri="{FF2B5EF4-FFF2-40B4-BE49-F238E27FC236}">
+                    <a16:creationId xmlns:a16="http://schemas.microsoft.com/office/drawing/2014/main" id="{FCFA6B3E-0A43-2DFD-2430-C10CEDD55013}"/>
+                  </a:ext>
+                </a:extLst>
+              </p:cNvPr>
+              <p:cNvSpPr/>
+              <p:nvPr/>
+            </p:nvSpPr>
+            <p:spPr>
+              <a:xfrm rot="19442577">
+                <a:off x="5174671" y="2439785"/>
+                <a:ext cx="1338350" cy="1338350"/>
+              </a:xfrm>
+              <a:prstGeom prst="arc">
+                <a:avLst>
+                  <a:gd name="adj1" fmla="val 16200000"/>
+                  <a:gd name="adj2" fmla="val 17477066"/>
+                </a:avLst>
+              </a:prstGeom>
+            </p:spPr>
+            <p:style>
+              <a:lnRef idx="2">
+                <a:schemeClr val="accent1"/>
+              </a:lnRef>
+              <a:fillRef idx="0">
+                <a:schemeClr val="accent1"/>
+              </a:fillRef>
+              <a:effectRef idx="1">
+                <a:schemeClr val="accent1"/>
+              </a:effectRef>
+              <a:fontRef idx="minor">
+                <a:schemeClr val="tx1"/>
+              </a:fontRef>
+            </p:style>
+            <p:txBody>
+              <a:bodyPr rtlCol="0" anchor="ctr"/>
+              <a:lstStyle/>
+              <a:p>
+                <a:pPr algn="ctr"/>
+                <a:endParaRPr lang="de-DE"/>
+              </a:p>
+            </p:txBody>
+          </p:sp>
+          <mc:AlternateContent xmlns:mc="http://schemas.openxmlformats.org/markup-compatibility/2006">
+            <mc:Choice xmlns:a14="http://schemas.microsoft.com/office/drawing/2010/main" Requires="a14">
+              <p:sp>
+                <p:nvSpPr>
+                  <p:cNvPr id="24" name="Textfeld 23">
+                    <a:extLst>
+                      <a:ext uri="{FF2B5EF4-FFF2-40B4-BE49-F238E27FC236}">
+                        <a16:creationId xmlns:a16="http://schemas.microsoft.com/office/drawing/2014/main" id="{AE07432D-BE71-12A6-D4EB-09C43D6D845E}"/>
+                      </a:ext>
+                    </a:extLst>
+                  </p:cNvPr>
+                  <p:cNvSpPr txBox="1"/>
+                  <p:nvPr/>
+                </p:nvSpPr>
+                <p:spPr>
+                  <a:xfrm>
+                    <a:off x="5517593" y="2494851"/>
+                    <a:ext cx="183062" cy="276999"/>
+                  </a:xfrm>
+                  <a:prstGeom prst="rect">
+                    <a:avLst/>
+                  </a:prstGeom>
+                  <a:noFill/>
+                </p:spPr>
+                <p:txBody>
+                  <a:bodyPr wrap="none" lIns="0" tIns="0" rIns="0" bIns="0" rtlCol="0">
+                    <a:spAutoFit/>
+                  </a:bodyPr>
+                  <a:lstStyle/>
+                  <a:p>
+                    <a:pPr/>
+                    <a14:m>
+                      <m:oMathPara xmlns:m="http://schemas.openxmlformats.org/officeDocument/2006/math">
+                        <m:oMathParaPr>
+                          <m:jc m:val="centerGroup"/>
+                        </m:oMathParaPr>
+                        <m:oMath xmlns:m="http://schemas.openxmlformats.org/officeDocument/2006/math">
+                          <m:r>
+                            <a:rPr lang="de-DE" b="0" i="1" smtClean="0">
+                              <a:latin typeface="Cambria Math" panose="02040503050406030204" pitchFamily="18" charset="0"/>
+                            </a:rPr>
+                            <m:t>𝜃</m:t>
+                          </m:r>
+                        </m:oMath>
+                      </m:oMathPara>
+                    </a14:m>
+                    <a:endParaRPr lang="de-DE" b="0" dirty="0"/>
+                  </a:p>
+                </p:txBody>
+              </p:sp>
+            </mc:Choice>
+            <mc:Fallback>
+              <p:sp>
+                <p:nvSpPr>
+                  <p:cNvPr id="24" name="Textfeld 23">
+                    <a:extLst>
+                      <a:ext uri="{FF2B5EF4-FFF2-40B4-BE49-F238E27FC236}">
+                        <a16:creationId xmlns:a16="http://schemas.microsoft.com/office/drawing/2014/main" id="{AE07432D-BE71-12A6-D4EB-09C43D6D845E}"/>
+                      </a:ext>
+                    </a:extLst>
+                  </p:cNvPr>
+                  <p:cNvSpPr txBox="1">
+                    <a:spLocks noRot="1" noChangeAspect="1" noMove="1" noResize="1" noEditPoints="1" noAdjustHandles="1" noChangeArrowheads="1" noChangeShapeType="1" noTextEdit="1"/>
+                  </p:cNvSpPr>
+                  <p:nvPr/>
+                </p:nvSpPr>
+                <p:spPr>
+                  <a:xfrm>
+                    <a:off x="5517593" y="2494851"/>
+                    <a:ext cx="183062" cy="276999"/>
+                  </a:xfrm>
+                  <a:prstGeom prst="rect">
+                    <a:avLst/>
+                  </a:prstGeom>
+                  <a:blipFill>
+                    <a:blip r:embed="rId2"/>
+                    <a:stretch>
+                      <a:fillRect l="-30000" r="-30000" b="-6522"/>
+                    </a:stretch>
+                  </a:blipFill>
+                </p:spPr>
+                <p:txBody>
+                  <a:bodyPr/>
+                  <a:lstStyle/>
+                  <a:p>
+                    <a:r>
+                      <a:rPr lang="de-DE">
+                        <a:noFill/>
+                      </a:rPr>
+                      <a:t> </a:t>
+                    </a:r>
+                  </a:p>
+                </p:txBody>
+              </p:sp>
+            </mc:Fallback>
+          </mc:AlternateContent>
+        </p:grpSp>
+      </p:grpSp>
+    </p:spTree>
+    <p:extLst>
+      <p:ext uri="{BB962C8B-B14F-4D97-AF65-F5344CB8AC3E}">
+        <p14:creationId xmlns:p14="http://schemas.microsoft.com/office/powerpoint/2010/main" val="55806680"/>
+      </p:ext>
+    </p:extLst>
+  </p:cSld>
+  <p:clrMapOvr>
+    <a:masterClrMapping/>
+  </p:clrMapOvr>
+</p:sld>
+</file>
+
+<file path=ppt/slides/slide5.xml><?xml version="1.0" encoding="utf-8"?>
+<p:sld xmlns:a="http://schemas.openxmlformats.org/drawingml/2006/main" xmlns:r="http://schemas.openxmlformats.org/officeDocument/2006/relationships" xmlns:p="http://schemas.openxmlformats.org/presentationml/2006/main">
+  <p:cSld>
+    <p:spTree>
+      <p:nvGrpSpPr>
+        <p:cNvPr id="1" name=""/>
+        <p:cNvGrpSpPr/>
+        <p:nvPr/>
+      </p:nvGrpSpPr>
+      <p:grpSpPr>
+        <a:xfrm>
+          <a:off x="0" y="0"/>
+          <a:ext cx="0" cy="0"/>
+          <a:chOff x="0" y="0"/>
+          <a:chExt cx="0" cy="0"/>
+        </a:xfrm>
+      </p:grpSpPr>
+      <p:grpSp>
+        <p:nvGrpSpPr>
+          <p:cNvPr id="47" name="Gruppieren 46">
+            <a:extLst>
+              <a:ext uri="{FF2B5EF4-FFF2-40B4-BE49-F238E27FC236}">
+                <a16:creationId xmlns:a16="http://schemas.microsoft.com/office/drawing/2014/main" id="{44DEC203-03FE-E39E-9357-38230057B84F}"/>
+              </a:ext>
+            </a:extLst>
+          </p:cNvPr>
+          <p:cNvGrpSpPr/>
+          <p:nvPr/>
+        </p:nvGrpSpPr>
+        <p:grpSpPr>
+          <a:xfrm>
+            <a:off x="-1663378" y="1718285"/>
+            <a:ext cx="15518756" cy="16573722"/>
+            <a:chOff x="-1663378" y="1718285"/>
+            <a:chExt cx="15518756" cy="16573722"/>
+          </a:xfrm>
+        </p:grpSpPr>
+        <p:grpSp>
+          <p:nvGrpSpPr>
+            <p:cNvPr id="4" name="Gruppieren 3">
+              <a:extLst>
+                <a:ext uri="{FF2B5EF4-FFF2-40B4-BE49-F238E27FC236}">
+                  <a16:creationId xmlns:a16="http://schemas.microsoft.com/office/drawing/2014/main" id="{4E73C16B-4B89-81B6-7441-4517CFE4651A}"/>
+                </a:ext>
+              </a:extLst>
+            </p:cNvPr>
+            <p:cNvGrpSpPr/>
+            <p:nvPr/>
+          </p:nvGrpSpPr>
+          <p:grpSpPr>
+            <a:xfrm>
+              <a:off x="-1663378" y="2773251"/>
+              <a:ext cx="15518756" cy="15518756"/>
+              <a:chOff x="-1587178" y="-4421817"/>
+              <a:chExt cx="15518756" cy="15518756"/>
+            </a:xfrm>
+          </p:grpSpPr>
+          <p:sp>
+            <p:nvSpPr>
+              <p:cNvPr id="2" name="Ellipse 1">
+                <a:extLst>
+                  <a:ext uri="{FF2B5EF4-FFF2-40B4-BE49-F238E27FC236}">
+                    <a16:creationId xmlns:a16="http://schemas.microsoft.com/office/drawing/2014/main" id="{1248AD4A-98BE-8CA5-AEDE-8410E6F362A7}"/>
+                  </a:ext>
+                </a:extLst>
+              </p:cNvPr>
+              <p:cNvSpPr/>
+              <p:nvPr/>
+            </p:nvSpPr>
+            <p:spPr>
+              <a:xfrm>
+                <a:off x="-1587178" y="-4421817"/>
+                <a:ext cx="15518756" cy="15518756"/>
+              </a:xfrm>
+              <a:prstGeom prst="ellipse">
+                <a:avLst/>
+              </a:prstGeom>
+              <a:solidFill>
+                <a:schemeClr val="tx2">
+                  <a:lumMod val="25000"/>
+                  <a:lumOff val="75000"/>
+                </a:schemeClr>
+              </a:solidFill>
+              <a:ln>
+                <a:solidFill>
+                  <a:schemeClr val="tx1"/>
+                </a:solidFill>
+              </a:ln>
+            </p:spPr>
+            <p:style>
+              <a:lnRef idx="2">
+                <a:schemeClr val="accent1">
+                  <a:shade val="15000"/>
+                </a:schemeClr>
+              </a:lnRef>
+              <a:fillRef idx="1">
+                <a:schemeClr val="accent1"/>
+              </a:fillRef>
+              <a:effectRef idx="0">
+                <a:schemeClr val="accent1"/>
+              </a:effectRef>
+              <a:fontRef idx="minor">
+                <a:schemeClr val="lt1"/>
+              </a:fontRef>
+            </p:style>
+            <p:txBody>
+              <a:bodyPr rtlCol="0" anchor="ctr"/>
+              <a:lstStyle/>
+              <a:p>
+                <a:pPr algn="ctr"/>
+                <a:endParaRPr lang="de-DE"/>
+              </a:p>
+            </p:txBody>
+          </p:sp>
+          <p:sp>
+            <p:nvSpPr>
+              <p:cNvPr id="3" name="Ellipse 2">
+                <a:extLst>
+                  <a:ext uri="{FF2B5EF4-FFF2-40B4-BE49-F238E27FC236}">
+                    <a16:creationId xmlns:a16="http://schemas.microsoft.com/office/drawing/2014/main" id="{0671BD4C-B7D9-DA40-E851-D4A7C74C696E}"/>
+                  </a:ext>
+                </a:extLst>
+              </p:cNvPr>
+              <p:cNvSpPr/>
+              <p:nvPr/>
+            </p:nvSpPr>
+            <p:spPr>
+              <a:xfrm>
+                <a:off x="-65214" y="-2896560"/>
+                <a:ext cx="12474828" cy="12468242"/>
+              </a:xfrm>
+              <a:prstGeom prst="ellipse">
+                <a:avLst/>
+              </a:prstGeom>
+              <a:solidFill>
+                <a:schemeClr val="accent3"/>
+              </a:solidFill>
+              <a:ln>
+                <a:solidFill>
+                  <a:schemeClr val="tx1"/>
+                </a:solidFill>
+              </a:ln>
+            </p:spPr>
+            <p:style>
+              <a:lnRef idx="2">
+                <a:schemeClr val="accent1">
+                  <a:shade val="15000"/>
+                </a:schemeClr>
+              </a:lnRef>
+              <a:fillRef idx="1">
+                <a:schemeClr val="accent1"/>
+              </a:fillRef>
+              <a:effectRef idx="0">
+                <a:schemeClr val="accent1"/>
+              </a:effectRef>
+              <a:fontRef idx="minor">
+                <a:schemeClr val="lt1"/>
+              </a:fontRef>
+            </p:style>
+            <p:txBody>
+              <a:bodyPr rtlCol="0" anchor="ctr"/>
+              <a:lstStyle/>
+              <a:p>
+                <a:pPr algn="ctr"/>
+                <a:endParaRPr lang="de-DE"/>
+              </a:p>
+            </p:txBody>
+          </p:sp>
+        </p:grpSp>
+        <p:cxnSp>
+          <p:nvCxnSpPr>
+            <p:cNvPr id="6" name="Gerade Verbindung mit Pfeil 5">
+              <a:extLst>
+                <a:ext uri="{FF2B5EF4-FFF2-40B4-BE49-F238E27FC236}">
+                  <a16:creationId xmlns:a16="http://schemas.microsoft.com/office/drawing/2014/main" id="{862795E3-975E-91CD-91C0-7909EB9DECBE}"/>
+                </a:ext>
+              </a:extLst>
+            </p:cNvPr>
+            <p:cNvCxnSpPr>
+              <a:cxnSpLocks/>
+              <a:stCxn id="3" idx="0"/>
+            </p:cNvCxnSpPr>
+            <p:nvPr/>
+          </p:nvCxnSpPr>
+          <p:spPr>
+            <a:xfrm flipH="1" flipV="1">
+              <a:off x="4922520" y="3836670"/>
+              <a:ext cx="1173480" cy="461838"/>
+            </a:xfrm>
+            <a:prstGeom prst="straightConnector1">
+              <a:avLst/>
+            </a:prstGeom>
+            <a:ln>
+              <a:solidFill>
+                <a:srgbClr val="FF0000"/>
+              </a:solidFill>
+              <a:tailEnd type="triangle"/>
+            </a:ln>
+          </p:spPr>
+          <p:style>
+            <a:lnRef idx="2">
+              <a:schemeClr val="accent1"/>
+            </a:lnRef>
+            <a:fillRef idx="0">
+              <a:schemeClr val="accent1"/>
+            </a:fillRef>
+            <a:effectRef idx="1">
+              <a:schemeClr val="accent1"/>
+            </a:effectRef>
+            <a:fontRef idx="minor">
+              <a:schemeClr val="tx1"/>
+            </a:fontRef>
+          </p:style>
+        </p:cxnSp>
+        <p:cxnSp>
+          <p:nvCxnSpPr>
+            <p:cNvPr id="15" name="Gerader Verbinder 14">
+              <a:extLst>
+                <a:ext uri="{FF2B5EF4-FFF2-40B4-BE49-F238E27FC236}">
+                  <a16:creationId xmlns:a16="http://schemas.microsoft.com/office/drawing/2014/main" id="{AC0E3158-6315-C5A5-2919-DC8513E7954D}"/>
+                </a:ext>
+              </a:extLst>
+            </p:cNvPr>
+            <p:cNvCxnSpPr>
+              <a:stCxn id="3" idx="0"/>
+            </p:cNvCxnSpPr>
+            <p:nvPr/>
+          </p:nvCxnSpPr>
+          <p:spPr>
+            <a:xfrm flipH="1">
+              <a:off x="2743200" y="4298508"/>
+              <a:ext cx="3352800" cy="0"/>
+            </a:xfrm>
+            <a:prstGeom prst="line">
+              <a:avLst/>
+            </a:prstGeom>
+            <a:ln>
+              <a:solidFill>
+                <a:schemeClr val="tx1"/>
+              </a:solidFill>
+              <a:prstDash val="lgDashDot"/>
+            </a:ln>
+          </p:spPr>
+          <p:style>
+            <a:lnRef idx="2">
+              <a:schemeClr val="accent1"/>
+            </a:lnRef>
+            <a:fillRef idx="0">
+              <a:schemeClr val="accent1"/>
+            </a:fillRef>
+            <a:effectRef idx="1">
+              <a:schemeClr val="accent1"/>
+            </a:effectRef>
+            <a:fontRef idx="minor">
+              <a:schemeClr val="tx1"/>
+            </a:fontRef>
+          </p:style>
+        </p:cxnSp>
+        <p:grpSp>
+          <p:nvGrpSpPr>
+            <p:cNvPr id="37" name="Gruppieren 36">
+              <a:extLst>
+                <a:ext uri="{FF2B5EF4-FFF2-40B4-BE49-F238E27FC236}">
+                  <a16:creationId xmlns:a16="http://schemas.microsoft.com/office/drawing/2014/main" id="{B3578C28-2810-7910-F0B8-70930DF6A4F9}"/>
+                </a:ext>
+              </a:extLst>
+            </p:cNvPr>
+            <p:cNvGrpSpPr/>
+            <p:nvPr/>
+          </p:nvGrpSpPr>
+          <p:grpSpPr>
+            <a:xfrm>
+              <a:off x="3442718" y="3120381"/>
+              <a:ext cx="2835783" cy="631498"/>
+              <a:chOff x="3442718" y="3120381"/>
+              <a:chExt cx="2835783" cy="631498"/>
+            </a:xfrm>
+          </p:grpSpPr>
+          <p:sp>
+            <p:nvSpPr>
+              <p:cNvPr id="25" name="Geschweifte Klammer rechts 24">
+                <a:extLst>
+                  <a:ext uri="{FF2B5EF4-FFF2-40B4-BE49-F238E27FC236}">
+                    <a16:creationId xmlns:a16="http://schemas.microsoft.com/office/drawing/2014/main" id="{508EC3C6-22FF-3AB9-4313-BA60C09B81BA}"/>
+                  </a:ext>
+                </a:extLst>
+              </p:cNvPr>
+              <p:cNvSpPr/>
+              <p:nvPr/>
+            </p:nvSpPr>
+            <p:spPr>
+              <a:xfrm rot="17519391">
+                <a:off x="4711298" y="2184675"/>
+                <a:ext cx="298624" cy="2835783"/>
+              </a:xfrm>
+              <a:prstGeom prst="rightBrace">
+                <a:avLst/>
+              </a:prstGeom>
+              <a:ln w="38100">
+                <a:solidFill>
+                  <a:schemeClr val="tx1"/>
+                </a:solidFill>
+              </a:ln>
+            </p:spPr>
+            <p:style>
+              <a:lnRef idx="2">
+                <a:schemeClr val="accent1"/>
+              </a:lnRef>
+              <a:fillRef idx="0">
+                <a:schemeClr val="accent1"/>
+              </a:fillRef>
+              <a:effectRef idx="1">
+                <a:schemeClr val="accent1"/>
+              </a:effectRef>
+              <a:fontRef idx="minor">
+                <a:schemeClr val="tx1"/>
+              </a:fontRef>
+            </p:style>
+            <p:txBody>
+              <a:bodyPr rtlCol="0" anchor="ctr"/>
+              <a:lstStyle/>
+              <a:p>
+                <a:pPr algn="ctr"/>
+                <a:endParaRPr lang="de-DE"/>
+              </a:p>
+            </p:txBody>
+          </p:sp>
+          <mc:AlternateContent xmlns:mc="http://schemas.openxmlformats.org/markup-compatibility/2006">
+            <mc:Choice xmlns:a14="http://schemas.microsoft.com/office/drawing/2010/main" Requires="a14">
+              <p:sp>
+                <p:nvSpPr>
+                  <p:cNvPr id="34" name="Textfeld 33">
+                    <a:extLst>
+                      <a:ext uri="{FF2B5EF4-FFF2-40B4-BE49-F238E27FC236}">
+                        <a16:creationId xmlns:a16="http://schemas.microsoft.com/office/drawing/2014/main" id="{9BC81B76-B67D-9E3E-EEF0-F615FD32896C}"/>
+                      </a:ext>
+                    </a:extLst>
+                  </p:cNvPr>
+                  <p:cNvSpPr txBox="1"/>
+                  <p:nvPr/>
+                </p:nvSpPr>
+                <p:spPr>
+                  <a:xfrm>
+                    <a:off x="4903813" y="3120381"/>
+                    <a:ext cx="496161" cy="298928"/>
+                  </a:xfrm>
+                  <a:prstGeom prst="rect">
+                    <a:avLst/>
+                  </a:prstGeom>
+                  <a:noFill/>
+                </p:spPr>
+                <p:txBody>
+                  <a:bodyPr wrap="none" lIns="0" tIns="0" rIns="0" bIns="0" rtlCol="0">
+                    <a:spAutoFit/>
+                  </a:bodyPr>
+                  <a:lstStyle/>
+                  <a:p>
+                    <a:pPr/>
+                    <a14:m>
+                      <m:oMathPara xmlns:m="http://schemas.openxmlformats.org/officeDocument/2006/math">
+                        <m:oMathParaPr>
+                          <m:jc m:val="centerGroup"/>
+                        </m:oMathParaPr>
+                        <m:oMath xmlns:m="http://schemas.openxmlformats.org/officeDocument/2006/math">
+                          <m:sSub>
+                            <m:sSubPr>
+                              <m:ctrlPr>
+                                <a:rPr lang="de-DE" b="0" i="1" smtClean="0">
+                                  <a:latin typeface="Cambria Math" panose="02040503050406030204" pitchFamily="18" charset="0"/>
+                                </a:rPr>
+                              </m:ctrlPr>
+                            </m:sSubPr>
+                            <m:e>
+                              <m:r>
+                                <a:rPr lang="de-DE" b="0" i="1" smtClean="0">
+                                  <a:latin typeface="Cambria Math" panose="02040503050406030204" pitchFamily="18" charset="0"/>
+                                </a:rPr>
+                                <m:t>𝑑</m:t>
+                              </m:r>
+                            </m:e>
+                            <m:sub>
+                              <m:r>
+                                <a:rPr lang="de-DE" b="0" i="1" smtClean="0">
+                                  <a:latin typeface="Cambria Math" panose="02040503050406030204" pitchFamily="18" charset="0"/>
+                                </a:rPr>
+                                <m:t>𝑟𝑎𝑦</m:t>
+                              </m:r>
+                            </m:sub>
+                          </m:sSub>
+                        </m:oMath>
+                      </m:oMathPara>
+                    </a14:m>
+                    <a:endParaRPr lang="de-DE" b="0" dirty="0"/>
+                  </a:p>
+                </p:txBody>
+              </p:sp>
+            </mc:Choice>
+            <mc:Fallback>
+              <p:sp>
+                <p:nvSpPr>
+                  <p:cNvPr id="34" name="Textfeld 33">
+                    <a:extLst>
+                      <a:ext uri="{FF2B5EF4-FFF2-40B4-BE49-F238E27FC236}">
+                        <a16:creationId xmlns:a16="http://schemas.microsoft.com/office/drawing/2014/main" id="{9BC81B76-B67D-9E3E-EEF0-F615FD32896C}"/>
+                      </a:ext>
+                    </a:extLst>
+                  </p:cNvPr>
+                  <p:cNvSpPr txBox="1">
+                    <a:spLocks noRot="1" noChangeAspect="1" noMove="1" noResize="1" noEditPoints="1" noAdjustHandles="1" noChangeArrowheads="1" noChangeShapeType="1" noTextEdit="1"/>
+                  </p:cNvSpPr>
+                  <p:nvPr/>
+                </p:nvSpPr>
+                <p:spPr>
+                  <a:xfrm>
+                    <a:off x="4903813" y="3120381"/>
+                    <a:ext cx="496161" cy="298928"/>
+                  </a:xfrm>
+                  <a:prstGeom prst="rect">
+                    <a:avLst/>
+                  </a:prstGeom>
+                  <a:blipFill>
+                    <a:blip r:embed="rId2"/>
+                    <a:stretch>
+                      <a:fillRect l="-12195" r="-4878" b="-20408"/>
+                    </a:stretch>
+                  </a:blipFill>
+                </p:spPr>
+                <p:txBody>
+                  <a:bodyPr/>
+                  <a:lstStyle/>
+                  <a:p>
+                    <a:r>
+                      <a:rPr lang="de-DE">
+                        <a:noFill/>
+                      </a:rPr>
+                      <a:t> </a:t>
+                    </a:r>
+                  </a:p>
+                </p:txBody>
+              </p:sp>
+            </mc:Fallback>
+          </mc:AlternateContent>
+        </p:grpSp>
+        <p:grpSp>
+          <p:nvGrpSpPr>
+            <p:cNvPr id="38" name="Gruppieren 37">
+              <a:extLst>
+                <a:ext uri="{FF2B5EF4-FFF2-40B4-BE49-F238E27FC236}">
+                  <a16:creationId xmlns:a16="http://schemas.microsoft.com/office/drawing/2014/main" id="{E1F31F7E-CA69-D8D0-CD08-512185997838}"/>
+                </a:ext>
+              </a:extLst>
+            </p:cNvPr>
+            <p:cNvGrpSpPr/>
+            <p:nvPr/>
+          </p:nvGrpSpPr>
+          <p:grpSpPr>
+            <a:xfrm>
+              <a:off x="2768977" y="3293244"/>
+              <a:ext cx="861117" cy="1484732"/>
+              <a:chOff x="2768977" y="3293244"/>
+              <a:chExt cx="861117" cy="1484732"/>
+            </a:xfrm>
+          </p:grpSpPr>
+          <p:sp>
+            <p:nvSpPr>
+              <p:cNvPr id="26" name="Geschweifte Klammer rechts 25">
+                <a:extLst>
+                  <a:ext uri="{FF2B5EF4-FFF2-40B4-BE49-F238E27FC236}">
+                    <a16:creationId xmlns:a16="http://schemas.microsoft.com/office/drawing/2014/main" id="{746B50F0-BB09-F0B4-4FCC-59A94217DD90}"/>
+                  </a:ext>
+                </a:extLst>
+              </p:cNvPr>
+              <p:cNvSpPr/>
+              <p:nvPr/>
+            </p:nvSpPr>
+            <p:spPr>
+              <a:xfrm rot="9537582">
+                <a:off x="3331701" y="3293244"/>
+                <a:ext cx="298393" cy="1484732"/>
+              </a:xfrm>
+              <a:prstGeom prst="rightBrace">
+                <a:avLst/>
+              </a:prstGeom>
+              <a:ln w="38100">
+                <a:solidFill>
+                  <a:schemeClr val="tx1"/>
+                </a:solidFill>
+              </a:ln>
+            </p:spPr>
+            <p:style>
+              <a:lnRef idx="2">
+                <a:schemeClr val="accent1"/>
+              </a:lnRef>
+              <a:fillRef idx="0">
+                <a:schemeClr val="accent1"/>
+              </a:fillRef>
+              <a:effectRef idx="1">
+                <a:schemeClr val="accent1"/>
+              </a:effectRef>
+              <a:fontRef idx="minor">
+                <a:schemeClr val="tx1"/>
+              </a:fontRef>
+            </p:style>
+            <p:txBody>
+              <a:bodyPr rtlCol="0" anchor="ctr"/>
+              <a:lstStyle/>
+              <a:p>
+                <a:pPr algn="ctr"/>
+                <a:endParaRPr lang="de-DE"/>
+              </a:p>
+            </p:txBody>
+          </p:sp>
+          <mc:AlternateContent xmlns:mc="http://schemas.openxmlformats.org/markup-compatibility/2006">
+            <mc:Choice xmlns:a14="http://schemas.microsoft.com/office/drawing/2010/main" Requires="a14">
+              <p:sp>
+                <p:nvSpPr>
+                  <p:cNvPr id="35" name="Textfeld 34">
+                    <a:extLst>
+                      <a:ext uri="{FF2B5EF4-FFF2-40B4-BE49-F238E27FC236}">
+                        <a16:creationId xmlns:a16="http://schemas.microsoft.com/office/drawing/2014/main" id="{A8049791-C14C-653F-B96C-B9C97A5A0C73}"/>
+                      </a:ext>
+                    </a:extLst>
+                  </p:cNvPr>
+                  <p:cNvSpPr txBox="1"/>
+                  <p:nvPr/>
+                </p:nvSpPr>
+                <p:spPr>
+                  <a:xfrm>
+                    <a:off x="2768977" y="3771039"/>
+                    <a:ext cx="555024" cy="298415"/>
+                  </a:xfrm>
+                  <a:prstGeom prst="rect">
+                    <a:avLst/>
+                  </a:prstGeom>
+                  <a:noFill/>
+                </p:spPr>
+                <p:txBody>
+                  <a:bodyPr wrap="none" lIns="0" tIns="0" rIns="0" bIns="0" rtlCol="0">
+                    <a:spAutoFit/>
+                  </a:bodyPr>
+                  <a:lstStyle/>
+                  <a:p>
+                    <a:pPr/>
+                    <a14:m>
+                      <m:oMathPara xmlns:m="http://schemas.openxmlformats.org/officeDocument/2006/math">
+                        <m:oMathParaPr>
+                          <m:jc m:val="centerGroup"/>
+                        </m:oMathParaPr>
+                        <m:oMath xmlns:m="http://schemas.openxmlformats.org/officeDocument/2006/math">
+                          <m:sSub>
+                            <m:sSubPr>
+                              <m:ctrlPr>
+                                <a:rPr lang="de-DE" b="0" i="1" smtClean="0">
+                                  <a:latin typeface="Cambria Math" panose="02040503050406030204" pitchFamily="18" charset="0"/>
+                                </a:rPr>
+                              </m:ctrlPr>
+                            </m:sSubPr>
+                            <m:e>
+                              <m:r>
+                                <a:rPr lang="de-DE" b="0" i="1" smtClean="0">
+                                  <a:latin typeface="Cambria Math" panose="02040503050406030204" pitchFamily="18" charset="0"/>
+                                </a:rPr>
+                                <m:t>h</m:t>
+                              </m:r>
+                            </m:e>
+                            <m:sub>
+                              <m:r>
+                                <a:rPr lang="de-DE" b="0" i="1" smtClean="0">
+                                  <a:latin typeface="Cambria Math" panose="02040503050406030204" pitchFamily="18" charset="0"/>
+                                </a:rPr>
+                                <m:t>𝑡𝑟𝑜𝑝</m:t>
+                              </m:r>
+                            </m:sub>
+                          </m:sSub>
+                        </m:oMath>
+                      </m:oMathPara>
+                    </a14:m>
+                    <a:endParaRPr lang="de-DE" b="0" dirty="0"/>
+                  </a:p>
+                </p:txBody>
+              </p:sp>
+            </mc:Choice>
+            <mc:Fallback>
+              <p:sp>
+                <p:nvSpPr>
+                  <p:cNvPr id="35" name="Textfeld 34">
+                    <a:extLst>
+                      <a:ext uri="{FF2B5EF4-FFF2-40B4-BE49-F238E27FC236}">
+                        <a16:creationId xmlns:a16="http://schemas.microsoft.com/office/drawing/2014/main" id="{A8049791-C14C-653F-B96C-B9C97A5A0C73}"/>
+                      </a:ext>
+                    </a:extLst>
+                  </p:cNvPr>
+                  <p:cNvSpPr txBox="1">
+                    <a:spLocks noRot="1" noChangeAspect="1" noMove="1" noResize="1" noEditPoints="1" noAdjustHandles="1" noChangeArrowheads="1" noChangeShapeType="1" noTextEdit="1"/>
+                  </p:cNvSpPr>
+                  <p:nvPr/>
+                </p:nvSpPr>
+                <p:spPr>
+                  <a:xfrm>
+                    <a:off x="2768977" y="3771039"/>
+                    <a:ext cx="555024" cy="298415"/>
+                  </a:xfrm>
+                  <a:prstGeom prst="rect">
+                    <a:avLst/>
+                  </a:prstGeom>
+                  <a:blipFill>
+                    <a:blip r:embed="rId3"/>
+                    <a:stretch>
+                      <a:fillRect l="-10989" r="-7692" b="-22449"/>
+                    </a:stretch>
+                  </a:blipFill>
+                </p:spPr>
+                <p:txBody>
+                  <a:bodyPr/>
+                  <a:lstStyle/>
+                  <a:p>
+                    <a:r>
+                      <a:rPr lang="de-DE">
+                        <a:noFill/>
+                      </a:rPr>
+                      <a:t> </a:t>
+                    </a:r>
+                  </a:p>
+                </p:txBody>
+              </p:sp>
+            </mc:Fallback>
+          </mc:AlternateContent>
+        </p:grpSp>
+        <p:grpSp>
+          <p:nvGrpSpPr>
+            <p:cNvPr id="39" name="Gruppieren 38">
+              <a:extLst>
+                <a:ext uri="{FF2B5EF4-FFF2-40B4-BE49-F238E27FC236}">
+                  <a16:creationId xmlns:a16="http://schemas.microsoft.com/office/drawing/2014/main" id="{12D022B2-A2DA-FAE7-9C20-BE69D009908E}"/>
+                </a:ext>
+              </a:extLst>
+            </p:cNvPr>
+            <p:cNvGrpSpPr/>
+            <p:nvPr/>
+          </p:nvGrpSpPr>
+          <p:grpSpPr>
+            <a:xfrm>
+              <a:off x="6096000" y="4298508"/>
+              <a:ext cx="994410" cy="2643312"/>
+              <a:chOff x="6096000" y="4298508"/>
+              <a:chExt cx="994410" cy="2643312"/>
+            </a:xfrm>
+          </p:grpSpPr>
+          <p:cxnSp>
+            <p:nvCxnSpPr>
+              <p:cNvPr id="29" name="Gerader Verbinder 28">
+                <a:extLst>
+                  <a:ext uri="{FF2B5EF4-FFF2-40B4-BE49-F238E27FC236}">
+                    <a16:creationId xmlns:a16="http://schemas.microsoft.com/office/drawing/2014/main" id="{189F8702-D55B-97A0-8EFA-03FDAE139656}"/>
+                  </a:ext>
+                </a:extLst>
+              </p:cNvPr>
+              <p:cNvCxnSpPr>
+                <a:stCxn id="3" idx="0"/>
+              </p:cNvCxnSpPr>
+              <p:nvPr/>
+            </p:nvCxnSpPr>
+            <p:spPr>
+              <a:xfrm>
+                <a:off x="6096000" y="4298508"/>
+                <a:ext cx="994410" cy="0"/>
+              </a:xfrm>
+              <a:prstGeom prst="line">
+                <a:avLst/>
+              </a:prstGeom>
+              <a:ln w="28575">
+                <a:solidFill>
+                  <a:schemeClr val="tx1"/>
+                </a:solidFill>
+              </a:ln>
+            </p:spPr>
+            <p:style>
+              <a:lnRef idx="2">
+                <a:schemeClr val="accent1"/>
+              </a:lnRef>
+              <a:fillRef idx="0">
+                <a:schemeClr val="accent1"/>
+              </a:fillRef>
+              <a:effectRef idx="1">
+                <a:schemeClr val="accent1"/>
+              </a:effectRef>
+              <a:fontRef idx="minor">
+                <a:schemeClr val="tx1"/>
+              </a:fontRef>
+            </p:style>
+          </p:cxnSp>
+          <p:cxnSp>
+            <p:nvCxnSpPr>
+              <p:cNvPr id="31" name="Gerade Verbindung mit Pfeil 30">
+                <a:extLst>
+                  <a:ext uri="{FF2B5EF4-FFF2-40B4-BE49-F238E27FC236}">
+                    <a16:creationId xmlns:a16="http://schemas.microsoft.com/office/drawing/2014/main" id="{EEBCF952-2745-4512-B70C-008E3179B99C}"/>
+                  </a:ext>
+                </a:extLst>
+              </p:cNvPr>
+              <p:cNvCxnSpPr/>
+              <p:nvPr/>
+            </p:nvCxnSpPr>
+            <p:spPr>
+              <a:xfrm flipV="1">
+                <a:off x="6949440" y="4298508"/>
+                <a:ext cx="0" cy="2643312"/>
+              </a:xfrm>
+              <a:prstGeom prst="straightConnector1">
+                <a:avLst/>
+              </a:prstGeom>
+              <a:ln w="38100">
+                <a:solidFill>
+                  <a:schemeClr val="tx1"/>
+                </a:solidFill>
+                <a:tailEnd type="triangle"/>
+              </a:ln>
+            </p:spPr>
+            <p:style>
+              <a:lnRef idx="2">
+                <a:schemeClr val="accent1"/>
+              </a:lnRef>
+              <a:fillRef idx="0">
+                <a:schemeClr val="accent1"/>
+              </a:fillRef>
+              <a:effectRef idx="1">
+                <a:schemeClr val="accent1"/>
+              </a:effectRef>
+              <a:fontRef idx="minor">
+                <a:schemeClr val="tx1"/>
+              </a:fontRef>
+            </p:style>
+          </p:cxnSp>
+          <mc:AlternateContent xmlns:mc="http://schemas.openxmlformats.org/markup-compatibility/2006">
+            <mc:Choice xmlns:a14="http://schemas.microsoft.com/office/drawing/2010/main" Requires="a14">
+              <p:sp>
+                <p:nvSpPr>
+                  <p:cNvPr id="36" name="Textfeld 35">
+                    <a:extLst>
+                      <a:ext uri="{FF2B5EF4-FFF2-40B4-BE49-F238E27FC236}">
+                        <a16:creationId xmlns:a16="http://schemas.microsoft.com/office/drawing/2014/main" id="{159F7E84-98D1-E1E4-26A3-3A7536852C66}"/>
+                      </a:ext>
+                    </a:extLst>
+                  </p:cNvPr>
+                  <p:cNvSpPr txBox="1"/>
+                  <p:nvPr/>
+                </p:nvSpPr>
+                <p:spPr>
+                  <a:xfrm>
+                    <a:off x="6638480" y="5823766"/>
+                    <a:ext cx="223138" cy="276999"/>
+                  </a:xfrm>
+                  <a:prstGeom prst="rect">
+                    <a:avLst/>
+                  </a:prstGeom>
+                  <a:noFill/>
+                </p:spPr>
+                <p:txBody>
+                  <a:bodyPr wrap="none" lIns="0" tIns="0" rIns="0" bIns="0" rtlCol="0">
+                    <a:spAutoFit/>
+                  </a:bodyPr>
+                  <a:lstStyle/>
+                  <a:p>
+                    <a:pPr/>
+                    <a14:m>
+                      <m:oMathPara xmlns:m="http://schemas.openxmlformats.org/officeDocument/2006/math">
+                        <m:oMathParaPr>
+                          <m:jc m:val="centerGroup"/>
+                        </m:oMathParaPr>
+                        <m:oMath xmlns:m="http://schemas.openxmlformats.org/officeDocument/2006/math">
+                          <m:sSub>
+                            <m:sSubPr>
+                              <m:ctrlPr>
+                                <a:rPr lang="de-DE" b="0" i="1" smtClean="0">
+                                  <a:latin typeface="Cambria Math" panose="02040503050406030204" pitchFamily="18" charset="0"/>
+                                </a:rPr>
+                              </m:ctrlPr>
+                            </m:sSubPr>
+                            <m:e>
+                              <m:r>
+                                <a:rPr lang="de-DE" b="0" i="1" smtClean="0">
+                                  <a:latin typeface="Cambria Math" panose="02040503050406030204" pitchFamily="18" charset="0"/>
+                                </a:rPr>
+                                <m:t>𝑟</m:t>
+                              </m:r>
+                            </m:e>
+                            <m:sub>
+                              <m:r>
+                                <a:rPr lang="de-DE" b="0" i="1" smtClean="0">
+                                  <a:latin typeface="Cambria Math" panose="02040503050406030204" pitchFamily="18" charset="0"/>
+                                </a:rPr>
+                                <m:t>𝑒</m:t>
+                              </m:r>
+                            </m:sub>
+                          </m:sSub>
+                        </m:oMath>
+                      </m:oMathPara>
+                    </a14:m>
+                    <a:endParaRPr lang="de-DE" b="0" dirty="0"/>
+                  </a:p>
+                </p:txBody>
+              </p:sp>
+            </mc:Choice>
+            <mc:Fallback>
+              <p:sp>
+                <p:nvSpPr>
+                  <p:cNvPr id="36" name="Textfeld 35">
+                    <a:extLst>
+                      <a:ext uri="{FF2B5EF4-FFF2-40B4-BE49-F238E27FC236}">
+                        <a16:creationId xmlns:a16="http://schemas.microsoft.com/office/drawing/2014/main" id="{159F7E84-98D1-E1E4-26A3-3A7536852C66}"/>
+                      </a:ext>
+                    </a:extLst>
+                  </p:cNvPr>
+                  <p:cNvSpPr txBox="1">
+                    <a:spLocks noRot="1" noChangeAspect="1" noMove="1" noResize="1" noEditPoints="1" noAdjustHandles="1" noChangeArrowheads="1" noChangeShapeType="1" noTextEdit="1"/>
+                  </p:cNvSpPr>
+                  <p:nvPr/>
+                </p:nvSpPr>
+                <p:spPr>
+                  <a:xfrm>
+                    <a:off x="6638480" y="5823766"/>
+                    <a:ext cx="223138" cy="276999"/>
+                  </a:xfrm>
+                  <a:prstGeom prst="rect">
+                    <a:avLst/>
+                  </a:prstGeom>
+                  <a:blipFill>
+                    <a:blip r:embed="rId4"/>
+                    <a:stretch>
+                      <a:fillRect l="-16216" r="-2703" b="-10870"/>
+                    </a:stretch>
+                  </a:blipFill>
+                </p:spPr>
+                <p:txBody>
+                  <a:bodyPr/>
+                  <a:lstStyle/>
+                  <a:p>
+                    <a:r>
+                      <a:rPr lang="de-DE">
+                        <a:noFill/>
+                      </a:rPr>
+                      <a:t> </a:t>
+                    </a:r>
+                  </a:p>
+                </p:txBody>
+              </p:sp>
+            </mc:Fallback>
+          </mc:AlternateContent>
+        </p:grpSp>
+        <p:grpSp>
+          <p:nvGrpSpPr>
+            <p:cNvPr id="46" name="Gruppieren 45">
+              <a:extLst>
+                <a:ext uri="{FF2B5EF4-FFF2-40B4-BE49-F238E27FC236}">
+                  <a16:creationId xmlns:a16="http://schemas.microsoft.com/office/drawing/2014/main" id="{4B9D1EDA-DF53-6DB8-B6AC-944CD1CF5E4B}"/>
+                </a:ext>
+              </a:extLst>
+            </p:cNvPr>
+            <p:cNvGrpSpPr/>
+            <p:nvPr/>
+          </p:nvGrpSpPr>
+          <p:grpSpPr>
+            <a:xfrm>
+              <a:off x="60584" y="1718285"/>
+              <a:ext cx="6919333" cy="8810476"/>
+              <a:chOff x="60584" y="1718285"/>
+              <a:chExt cx="6919333" cy="8810476"/>
+            </a:xfrm>
+          </p:grpSpPr>
+          <p:grpSp>
+            <p:nvGrpSpPr>
+              <p:cNvPr id="40" name="Gruppieren 39">
+                <a:extLst>
+                  <a:ext uri="{FF2B5EF4-FFF2-40B4-BE49-F238E27FC236}">
+                    <a16:creationId xmlns:a16="http://schemas.microsoft.com/office/drawing/2014/main" id="{EA18A01F-D016-416D-CA90-A381E4268CF0}"/>
+                  </a:ext>
+                </a:extLst>
+              </p:cNvPr>
+              <p:cNvGrpSpPr/>
+              <p:nvPr/>
+            </p:nvGrpSpPr>
+            <p:grpSpPr>
+              <a:xfrm>
+                <a:off x="60584" y="1718285"/>
+                <a:ext cx="6151621" cy="8810476"/>
+                <a:chOff x="60584" y="1718285"/>
+                <a:chExt cx="6151621" cy="8810476"/>
+              </a:xfrm>
+            </p:grpSpPr>
+            <p:sp>
+              <p:nvSpPr>
+                <p:cNvPr id="7" name="Ellipse 6">
+                  <a:extLst>
+                    <a:ext uri="{FF2B5EF4-FFF2-40B4-BE49-F238E27FC236}">
+                      <a16:creationId xmlns:a16="http://schemas.microsoft.com/office/drawing/2014/main" id="{53C38B0F-A7B9-01D1-AA59-872FB615C0B2}"/>
+                    </a:ext>
+                  </a:extLst>
+                </p:cNvPr>
+                <p:cNvSpPr/>
+                <p:nvPr/>
+              </p:nvSpPr>
+              <p:spPr>
+                <a:xfrm>
+                  <a:off x="60584" y="1718285"/>
+                  <a:ext cx="695460" cy="695460"/>
+                </a:xfrm>
+                <a:prstGeom prst="ellipse">
+                  <a:avLst/>
+                </a:prstGeom>
+                <a:solidFill>
+                  <a:srgbClr val="FFFF00"/>
+                </a:solidFill>
+                <a:ln>
+                  <a:solidFill>
+                    <a:schemeClr val="tx1"/>
+                  </a:solidFill>
+                </a:ln>
+              </p:spPr>
+              <p:style>
+                <a:lnRef idx="2">
+                  <a:schemeClr val="accent1">
+                    <a:shade val="15000"/>
+                  </a:schemeClr>
+                </a:lnRef>
+                <a:fillRef idx="1">
+                  <a:schemeClr val="accent1"/>
+                </a:fillRef>
+                <a:effectRef idx="0">
+                  <a:schemeClr val="accent1"/>
+                </a:effectRef>
+                <a:fontRef idx="minor">
+                  <a:schemeClr val="lt1"/>
+                </a:fontRef>
+              </p:style>
+              <p:txBody>
+                <a:bodyPr rtlCol="0" anchor="ctr"/>
+                <a:lstStyle/>
+                <a:p>
+                  <a:pPr algn="ctr"/>
+                  <a:endParaRPr lang="de-DE"/>
+                </a:p>
+              </p:txBody>
+            </p:sp>
+            <p:cxnSp>
+              <p:nvCxnSpPr>
+                <p:cNvPr id="10" name="Gerader Verbinder 9">
+                  <a:extLst>
+                    <a:ext uri="{FF2B5EF4-FFF2-40B4-BE49-F238E27FC236}">
+                      <a16:creationId xmlns:a16="http://schemas.microsoft.com/office/drawing/2014/main" id="{8BDCDD57-EBB4-106E-1347-0994FC5A99FF}"/>
+                    </a:ext>
+                  </a:extLst>
+                </p:cNvPr>
+                <p:cNvCxnSpPr>
+                  <a:cxnSpLocks/>
+                  <a:stCxn id="3" idx="0"/>
+                </p:cNvCxnSpPr>
+                <p:nvPr/>
+              </p:nvCxnSpPr>
+              <p:spPr>
+                <a:xfrm flipH="1" flipV="1">
+                  <a:off x="408314" y="2066015"/>
+                  <a:ext cx="5687686" cy="2232493"/>
+                </a:xfrm>
+                <a:prstGeom prst="line">
+                  <a:avLst/>
+                </a:prstGeom>
+                <a:ln>
+                  <a:solidFill>
+                    <a:schemeClr val="tx1"/>
+                  </a:solidFill>
+                  <a:prstDash val="dash"/>
+                </a:ln>
+              </p:spPr>
+              <p:style>
+                <a:lnRef idx="2">
+                  <a:schemeClr val="accent1"/>
+                </a:lnRef>
+                <a:fillRef idx="0">
+                  <a:schemeClr val="accent1"/>
+                </a:fillRef>
+                <a:effectRef idx="1">
+                  <a:schemeClr val="accent1"/>
+                </a:effectRef>
+                <a:fontRef idx="minor">
+                  <a:schemeClr val="tx1"/>
+                </a:fontRef>
+              </p:style>
+            </p:cxnSp>
+            <p:cxnSp>
+              <p:nvCxnSpPr>
+                <p:cNvPr id="16" name="Gerader Verbinder 15">
+                  <a:extLst>
+                    <a:ext uri="{FF2B5EF4-FFF2-40B4-BE49-F238E27FC236}">
+                      <a16:creationId xmlns:a16="http://schemas.microsoft.com/office/drawing/2014/main" id="{2F56930D-6909-7F59-6AEA-89ACEB77AF98}"/>
+                    </a:ext>
+                  </a:extLst>
+                </p:cNvPr>
+                <p:cNvCxnSpPr>
+                  <a:cxnSpLocks/>
+                </p:cNvCxnSpPr>
+                <p:nvPr/>
+              </p:nvCxnSpPr>
+              <p:spPr>
+                <a:xfrm flipH="1" flipV="1">
+                  <a:off x="3409950" y="3242310"/>
+                  <a:ext cx="2802255" cy="7254240"/>
+                </a:xfrm>
+                <a:prstGeom prst="line">
+                  <a:avLst/>
+                </a:prstGeom>
+                <a:ln>
+                  <a:solidFill>
+                    <a:schemeClr val="tx1"/>
+                  </a:solidFill>
+                  <a:prstDash val="dash"/>
+                </a:ln>
+              </p:spPr>
+              <p:style>
+                <a:lnRef idx="2">
+                  <a:schemeClr val="accent1"/>
+                </a:lnRef>
+                <a:fillRef idx="0">
+                  <a:schemeClr val="accent1"/>
+                </a:fillRef>
+                <a:effectRef idx="1">
+                  <a:schemeClr val="accent1"/>
+                </a:effectRef>
+                <a:fontRef idx="minor">
+                  <a:schemeClr val="tx1"/>
+                </a:fontRef>
+              </p:style>
+            </p:cxnSp>
+            <p:cxnSp>
+              <p:nvCxnSpPr>
+                <p:cNvPr id="20" name="Gerader Verbinder 19">
+                  <a:extLst>
+                    <a:ext uri="{FF2B5EF4-FFF2-40B4-BE49-F238E27FC236}">
+                      <a16:creationId xmlns:a16="http://schemas.microsoft.com/office/drawing/2014/main" id="{4AA7EE36-7004-69A8-DC4F-58EAD5636B04}"/>
+                    </a:ext>
+                  </a:extLst>
+                </p:cNvPr>
+                <p:cNvCxnSpPr>
+                  <a:cxnSpLocks/>
+                  <a:endCxn id="3" idx="0"/>
+                </p:cNvCxnSpPr>
+                <p:nvPr/>
+              </p:nvCxnSpPr>
+              <p:spPr>
+                <a:xfrm flipH="1" flipV="1">
+                  <a:off x="6096000" y="4298508"/>
+                  <a:ext cx="116205" cy="6230253"/>
+                </a:xfrm>
+                <a:prstGeom prst="line">
+                  <a:avLst/>
+                </a:prstGeom>
+                <a:ln>
+                  <a:solidFill>
+                    <a:schemeClr val="tx1"/>
+                  </a:solidFill>
+                  <a:prstDash val="dash"/>
+                </a:ln>
+              </p:spPr>
+              <p:style>
+                <a:lnRef idx="2">
+                  <a:schemeClr val="accent1"/>
+                </a:lnRef>
+                <a:fillRef idx="0">
+                  <a:schemeClr val="accent1"/>
+                </a:fillRef>
+                <a:effectRef idx="1">
+                  <a:schemeClr val="accent1"/>
+                </a:effectRef>
+                <a:fontRef idx="minor">
+                  <a:schemeClr val="tx1"/>
+                </a:fontRef>
+              </p:style>
+            </p:cxnSp>
+          </p:grpSp>
+          <mc:AlternateContent xmlns:mc="http://schemas.openxmlformats.org/markup-compatibility/2006">
+            <mc:Choice xmlns:a14="http://schemas.microsoft.com/office/drawing/2010/main" Requires="a14">
+              <p:sp>
+                <p:nvSpPr>
+                  <p:cNvPr id="43" name="Textfeld 42">
+                    <a:extLst>
+                      <a:ext uri="{FF2B5EF4-FFF2-40B4-BE49-F238E27FC236}">
+                        <a16:creationId xmlns:a16="http://schemas.microsoft.com/office/drawing/2014/main" id="{FBF07D85-B60A-3523-8A5D-9A7E9C3188BA}"/>
+                      </a:ext>
+                    </a:extLst>
+                  </p:cNvPr>
+                  <p:cNvSpPr txBox="1"/>
+                  <p:nvPr/>
+                </p:nvSpPr>
+                <p:spPr>
+                  <a:xfrm>
+                    <a:off x="5334212" y="4005453"/>
+                    <a:ext cx="175048" cy="276999"/>
+                  </a:xfrm>
+                  <a:prstGeom prst="rect">
+                    <a:avLst/>
+                  </a:prstGeom>
+                  <a:noFill/>
+                </p:spPr>
+                <p:txBody>
+                  <a:bodyPr wrap="none" lIns="0" tIns="0" rIns="0" bIns="0" rtlCol="0">
+                    <a:spAutoFit/>
+                  </a:bodyPr>
+                  <a:lstStyle/>
+                  <a:p>
+                    <a:pPr/>
+                    <a14:m>
+                      <m:oMathPara xmlns:m="http://schemas.openxmlformats.org/officeDocument/2006/math">
+                        <m:oMathParaPr>
+                          <m:jc m:val="centerGroup"/>
+                        </m:oMathParaPr>
+                        <m:oMath xmlns:m="http://schemas.openxmlformats.org/officeDocument/2006/math">
+                          <m:r>
+                            <a:rPr lang="de-DE" b="0" i="1" smtClean="0">
+                              <a:latin typeface="Cambria Math" panose="02040503050406030204" pitchFamily="18" charset="0"/>
+                            </a:rPr>
+                            <m:t>𝜂</m:t>
+                          </m:r>
+                        </m:oMath>
+                      </m:oMathPara>
+                    </a14:m>
+                    <a:endParaRPr lang="de-DE" b="0" dirty="0"/>
+                  </a:p>
+                </p:txBody>
+              </p:sp>
+            </mc:Choice>
+            <mc:Fallback>
+              <p:sp>
+                <p:nvSpPr>
+                  <p:cNvPr id="43" name="Textfeld 42">
+                    <a:extLst>
+                      <a:ext uri="{FF2B5EF4-FFF2-40B4-BE49-F238E27FC236}">
+                        <a16:creationId xmlns:a16="http://schemas.microsoft.com/office/drawing/2014/main" id="{FBF07D85-B60A-3523-8A5D-9A7E9C3188BA}"/>
+                      </a:ext>
+                    </a:extLst>
+                  </p:cNvPr>
+                  <p:cNvSpPr txBox="1">
+                    <a:spLocks noRot="1" noChangeAspect="1" noMove="1" noResize="1" noEditPoints="1" noAdjustHandles="1" noChangeArrowheads="1" noChangeShapeType="1" noTextEdit="1"/>
+                  </p:cNvSpPr>
+                  <p:nvPr/>
+                </p:nvSpPr>
+                <p:spPr>
+                  <a:xfrm>
+                    <a:off x="5334212" y="4005453"/>
+                    <a:ext cx="175048" cy="276999"/>
+                  </a:xfrm>
+                  <a:prstGeom prst="rect">
+                    <a:avLst/>
+                  </a:prstGeom>
+                  <a:blipFill>
+                    <a:blip r:embed="rId5"/>
+                    <a:stretch>
+                      <a:fillRect l="-34483" r="-31034" b="-23913"/>
+                    </a:stretch>
+                  </a:blipFill>
+                </p:spPr>
+                <p:txBody>
+                  <a:bodyPr/>
+                  <a:lstStyle/>
+                  <a:p>
+                    <a:r>
+                      <a:rPr lang="de-DE">
+                        <a:noFill/>
+                      </a:rPr>
+                      <a:t> </a:t>
+                    </a:r>
+                  </a:p>
+                </p:txBody>
+              </p:sp>
+            </mc:Fallback>
+          </mc:AlternateContent>
+          <p:sp>
+            <p:nvSpPr>
+              <p:cNvPr id="45" name="Bogen 44">
+                <a:extLst>
+                  <a:ext uri="{FF2B5EF4-FFF2-40B4-BE49-F238E27FC236}">
+                    <a16:creationId xmlns:a16="http://schemas.microsoft.com/office/drawing/2014/main" id="{490CF972-C3FB-35C0-58DB-0BE7A43A9B4D}"/>
+                  </a:ext>
+                </a:extLst>
+              </p:cNvPr>
+              <p:cNvSpPr/>
+              <p:nvPr/>
+            </p:nvSpPr>
+            <p:spPr>
+              <a:xfrm rot="16200000">
+                <a:off x="5212083" y="3414591"/>
+                <a:ext cx="1767834" cy="1767834"/>
+              </a:xfrm>
+              <a:prstGeom prst="arc">
+                <a:avLst>
+                  <a:gd name="adj1" fmla="val 16200000"/>
+                  <a:gd name="adj2" fmla="val 17539590"/>
+                </a:avLst>
+              </a:prstGeom>
+              <a:ln>
+                <a:solidFill>
+                  <a:schemeClr val="tx1"/>
+                </a:solidFill>
+              </a:ln>
+            </p:spPr>
+            <p:style>
+              <a:lnRef idx="2">
+                <a:schemeClr val="accent1"/>
+              </a:lnRef>
+              <a:fillRef idx="0">
+                <a:schemeClr val="accent1"/>
+              </a:fillRef>
+              <a:effectRef idx="1">
+                <a:schemeClr val="accent1"/>
+              </a:effectRef>
+              <a:fontRef idx="minor">
+                <a:schemeClr val="tx1"/>
+              </a:fontRef>
+            </p:style>
+            <p:txBody>
+              <a:bodyPr rtlCol="0" anchor="ctr"/>
+              <a:lstStyle/>
+              <a:p>
+                <a:pPr algn="ctr"/>
+                <a:endParaRPr lang="de-DE"/>
+              </a:p>
+            </p:txBody>
+          </p:sp>
+        </p:grpSp>
+      </p:grpSp>
+    </p:spTree>
+    <p:extLst>
+      <p:ext uri="{BB962C8B-B14F-4D97-AF65-F5344CB8AC3E}">
+        <p14:creationId xmlns:p14="http://schemas.microsoft.com/office/powerpoint/2010/main" val="2894640252"/>
+      </p:ext>
+    </p:extLst>
+  </p:cSld>
+  <p:clrMapOvr>
+    <a:masterClrMapping/>
+  </p:clrMapOvr>
+</p:sld>
+</file>
+
+<file path=ppt/slides/slide6.xml><?xml version="1.0" encoding="utf-8"?>
 <p:sld xmlns:a="http://schemas.openxmlformats.org/drawingml/2006/main" xmlns:r="http://schemas.openxmlformats.org/officeDocument/2006/relationships" xmlns:p="http://schemas.openxmlformats.org/presentationml/2006/main">
   <p:cSld>
     <p:spTree>

</xml_diff>